<commit_message>
Added meme at the end
</commit_message>
<xml_diff>
--- a/SS2017_Git_2017-04-27_Stodolka_Struzek.pptx
+++ b/SS2017_Git_2017-04-27_Stodolka_Struzek.pptx
@@ -5,7 +5,7 @@
     <p:sldMasterId id="2147484128" r:id="rId1"/>
   </p:sldMasterIdLst>
   <p:notesMasterIdLst>
-    <p:notesMasterId r:id="rId47"/>
+    <p:notesMasterId r:id="rId48"/>
   </p:notesMasterIdLst>
   <p:sldIdLst>
     <p:sldId id="256" r:id="rId2"/>
@@ -46,13 +46,14 @@
     <p:sldId id="293" r:id="rId37"/>
     <p:sldId id="288" r:id="rId38"/>
     <p:sldId id="270" r:id="rId39"/>
-    <p:sldId id="305" r:id="rId40"/>
-    <p:sldId id="306" r:id="rId41"/>
-    <p:sldId id="297" r:id="rId42"/>
-    <p:sldId id="344" r:id="rId43"/>
-    <p:sldId id="345" r:id="rId44"/>
-    <p:sldId id="346" r:id="rId45"/>
-    <p:sldId id="307" r:id="rId46"/>
+    <p:sldId id="348" r:id="rId40"/>
+    <p:sldId id="305" r:id="rId41"/>
+    <p:sldId id="306" r:id="rId42"/>
+    <p:sldId id="297" r:id="rId43"/>
+    <p:sldId id="344" r:id="rId44"/>
+    <p:sldId id="345" r:id="rId45"/>
+    <p:sldId id="346" r:id="rId46"/>
+    <p:sldId id="307" r:id="rId47"/>
   </p:sldIdLst>
   <p:sldSz cx="9144000" cy="6858000" type="screen4x3"/>
   <p:notesSz cx="6858000" cy="9734550"/>
@@ -1422,523 +1423,6 @@
       <dsp:cNvGrpSpPr/>
     </dsp:nvGrpSpPr>
     <dsp:grpSpPr/>
-    <dsp:sp modelId="{709AF982-B7B1-45BE-90BC-38F157C5AE93}">
-      <dsp:nvSpPr>
-        <dsp:cNvPr id="0" name=""/>
-        <dsp:cNvSpPr/>
-      </dsp:nvSpPr>
-      <dsp:spPr>
-        <a:xfrm>
-          <a:off x="2510" y="866754"/>
-          <a:ext cx="1097552" cy="658531"/>
-        </a:xfrm>
-        <a:prstGeom prst="roundRect">
-          <a:avLst>
-            <a:gd name="adj" fmla="val 10000"/>
-          </a:avLst>
-        </a:prstGeom>
-        <a:solidFill>
-          <a:schemeClr val="accent2">
-            <a:hueOff val="0"/>
-            <a:satOff val="0"/>
-            <a:lumOff val="0"/>
-            <a:alphaOff val="0"/>
-          </a:schemeClr>
-        </a:solidFill>
-        <a:ln w="25400" cap="flat" cmpd="sng" algn="ctr">
-          <a:solidFill>
-            <a:schemeClr val="lt1">
-              <a:hueOff val="0"/>
-              <a:satOff val="0"/>
-              <a:lumOff val="0"/>
-              <a:alphaOff val="0"/>
-            </a:schemeClr>
-          </a:solidFill>
-          <a:prstDash val="solid"/>
-        </a:ln>
-        <a:effectLst/>
-      </dsp:spPr>
-      <dsp:style>
-        <a:lnRef idx="2">
-          <a:scrgbClr r="0" g="0" b="0"/>
-        </a:lnRef>
-        <a:fillRef idx="1">
-          <a:scrgbClr r="0" g="0" b="0"/>
-        </a:fillRef>
-        <a:effectRef idx="0">
-          <a:scrgbClr r="0" g="0" b="0"/>
-        </a:effectRef>
-        <a:fontRef idx="minor">
-          <a:schemeClr val="lt1"/>
-        </a:fontRef>
-      </dsp:style>
-      <dsp:txBody>
-        <a:bodyPr spcFirstLastPara="0" vert="horz" wrap="square" lIns="80010" tIns="80010" rIns="80010" bIns="80010" numCol="1" spcCol="1270" anchor="ctr" anchorCtr="0">
-          <a:noAutofit/>
-        </a:bodyPr>
-        <a:lstStyle/>
-        <a:p>
-          <a:pPr lvl="0" algn="ctr" defTabSz="933450">
-            <a:lnSpc>
-              <a:spcPct val="90000"/>
-            </a:lnSpc>
-            <a:spcBef>
-              <a:spcPct val="0"/>
-            </a:spcBef>
-            <a:spcAft>
-              <a:spcPct val="35000"/>
-            </a:spcAft>
-          </a:pPr>
-          <a:r>
-            <a:rPr lang="de-DE" sz="2100" kern="1200" dirty="0" err="1"/>
-            <a:t>Clone</a:t>
-          </a:r>
-          <a:endParaRPr lang="de-DE" sz="2100" kern="1200" dirty="0"/>
-        </a:p>
-      </dsp:txBody>
-      <dsp:txXfrm>
-        <a:off x="21798" y="886042"/>
-        <a:ext cx="1058976" cy="619955"/>
-      </dsp:txXfrm>
-    </dsp:sp>
-    <dsp:sp modelId="{A48F5A5F-34D0-4559-BAC7-7C309FF557E1}">
-      <dsp:nvSpPr>
-        <dsp:cNvPr id="0" name=""/>
-        <dsp:cNvSpPr/>
-      </dsp:nvSpPr>
-      <dsp:spPr>
-        <a:xfrm>
-          <a:off x="1209818" y="1059923"/>
-          <a:ext cx="232681" cy="272193"/>
-        </a:xfrm>
-        <a:prstGeom prst="rightArrow">
-          <a:avLst>
-            <a:gd name="adj1" fmla="val 60000"/>
-            <a:gd name="adj2" fmla="val 50000"/>
-          </a:avLst>
-        </a:prstGeom>
-        <a:solidFill>
-          <a:schemeClr val="accent2">
-            <a:hueOff val="0"/>
-            <a:satOff val="0"/>
-            <a:lumOff val="0"/>
-            <a:alphaOff val="0"/>
-          </a:schemeClr>
-        </a:solidFill>
-        <a:ln>
-          <a:noFill/>
-        </a:ln>
-        <a:effectLst/>
-      </dsp:spPr>
-      <dsp:style>
-        <a:lnRef idx="0">
-          <a:scrgbClr r="0" g="0" b="0"/>
-        </a:lnRef>
-        <a:fillRef idx="1">
-          <a:scrgbClr r="0" g="0" b="0"/>
-        </a:fillRef>
-        <a:effectRef idx="0">
-          <a:scrgbClr r="0" g="0" b="0"/>
-        </a:effectRef>
-        <a:fontRef idx="minor">
-          <a:schemeClr val="lt1"/>
-        </a:fontRef>
-      </dsp:style>
-      <dsp:txBody>
-        <a:bodyPr spcFirstLastPara="0" vert="horz" wrap="square" lIns="0" tIns="0" rIns="0" bIns="0" numCol="1" spcCol="1270" anchor="ctr" anchorCtr="0">
-          <a:noAutofit/>
-        </a:bodyPr>
-        <a:lstStyle/>
-        <a:p>
-          <a:pPr lvl="0" algn="ctr" defTabSz="488950">
-            <a:lnSpc>
-              <a:spcPct val="90000"/>
-            </a:lnSpc>
-            <a:spcBef>
-              <a:spcPct val="0"/>
-            </a:spcBef>
-            <a:spcAft>
-              <a:spcPct val="35000"/>
-            </a:spcAft>
-          </a:pPr>
-          <a:endParaRPr lang="de-DE" sz="1100" kern="1200"/>
-        </a:p>
-      </dsp:txBody>
-      <dsp:txXfrm>
-        <a:off x="1209818" y="1114362"/>
-        <a:ext cx="162877" cy="163315"/>
-      </dsp:txXfrm>
-    </dsp:sp>
-    <dsp:sp modelId="{AD9DCF4C-0605-46C4-85C9-93C342559E76}">
-      <dsp:nvSpPr>
-        <dsp:cNvPr id="0" name=""/>
-        <dsp:cNvSpPr/>
-      </dsp:nvSpPr>
-      <dsp:spPr>
-        <a:xfrm>
-          <a:off x="1539084" y="866754"/>
-          <a:ext cx="1097552" cy="658531"/>
-        </a:xfrm>
-        <a:prstGeom prst="roundRect">
-          <a:avLst>
-            <a:gd name="adj" fmla="val 10000"/>
-          </a:avLst>
-        </a:prstGeom>
-        <a:solidFill>
-          <a:schemeClr val="accent3">
-            <a:hueOff val="0"/>
-            <a:satOff val="0"/>
-            <a:lumOff val="0"/>
-            <a:alphaOff val="0"/>
-          </a:schemeClr>
-        </a:solidFill>
-        <a:ln w="25400" cap="flat" cmpd="sng" algn="ctr">
-          <a:solidFill>
-            <a:schemeClr val="lt1">
-              <a:hueOff val="0"/>
-              <a:satOff val="0"/>
-              <a:lumOff val="0"/>
-              <a:alphaOff val="0"/>
-            </a:schemeClr>
-          </a:solidFill>
-          <a:prstDash val="solid"/>
-        </a:ln>
-        <a:effectLst/>
-      </dsp:spPr>
-      <dsp:style>
-        <a:lnRef idx="2">
-          <a:scrgbClr r="0" g="0" b="0"/>
-        </a:lnRef>
-        <a:fillRef idx="1">
-          <a:scrgbClr r="0" g="0" b="0"/>
-        </a:fillRef>
-        <a:effectRef idx="0">
-          <a:scrgbClr r="0" g="0" b="0"/>
-        </a:effectRef>
-        <a:fontRef idx="minor">
-          <a:schemeClr val="lt1"/>
-        </a:fontRef>
-      </dsp:style>
-      <dsp:txBody>
-        <a:bodyPr spcFirstLastPara="0" vert="horz" wrap="square" lIns="80010" tIns="80010" rIns="80010" bIns="80010" numCol="1" spcCol="1270" anchor="ctr" anchorCtr="0">
-          <a:noAutofit/>
-        </a:bodyPr>
-        <a:lstStyle/>
-        <a:p>
-          <a:pPr lvl="0" algn="ctr" defTabSz="933450">
-            <a:lnSpc>
-              <a:spcPct val="90000"/>
-            </a:lnSpc>
-            <a:spcBef>
-              <a:spcPct val="0"/>
-            </a:spcBef>
-            <a:spcAft>
-              <a:spcPct val="35000"/>
-            </a:spcAft>
-          </a:pPr>
-          <a:r>
-            <a:rPr lang="de-DE" sz="2100" kern="1200" dirty="0"/>
-            <a:t>Commit</a:t>
-          </a:r>
-        </a:p>
-      </dsp:txBody>
-      <dsp:txXfrm>
-        <a:off x="1558372" y="886042"/>
-        <a:ext cx="1058976" cy="619955"/>
-      </dsp:txXfrm>
-    </dsp:sp>
-    <dsp:sp modelId="{9D251249-FB11-4901-92B0-6A52F131753F}">
-      <dsp:nvSpPr>
-        <dsp:cNvPr id="0" name=""/>
-        <dsp:cNvSpPr/>
-      </dsp:nvSpPr>
-      <dsp:spPr>
-        <a:xfrm>
-          <a:off x="2746392" y="1059923"/>
-          <a:ext cx="232681" cy="272193"/>
-        </a:xfrm>
-        <a:prstGeom prst="rightArrow">
-          <a:avLst>
-            <a:gd name="adj1" fmla="val 60000"/>
-            <a:gd name="adj2" fmla="val 50000"/>
-          </a:avLst>
-        </a:prstGeom>
-        <a:solidFill>
-          <a:schemeClr val="accent3">
-            <a:hueOff val="0"/>
-            <a:satOff val="0"/>
-            <a:lumOff val="0"/>
-            <a:alphaOff val="0"/>
-          </a:schemeClr>
-        </a:solidFill>
-        <a:ln>
-          <a:noFill/>
-        </a:ln>
-        <a:effectLst/>
-      </dsp:spPr>
-      <dsp:style>
-        <a:lnRef idx="0">
-          <a:scrgbClr r="0" g="0" b="0"/>
-        </a:lnRef>
-        <a:fillRef idx="1">
-          <a:scrgbClr r="0" g="0" b="0"/>
-        </a:fillRef>
-        <a:effectRef idx="0">
-          <a:scrgbClr r="0" g="0" b="0"/>
-        </a:effectRef>
-        <a:fontRef idx="minor">
-          <a:schemeClr val="lt1"/>
-        </a:fontRef>
-      </dsp:style>
-      <dsp:txBody>
-        <a:bodyPr spcFirstLastPara="0" vert="horz" wrap="square" lIns="0" tIns="0" rIns="0" bIns="0" numCol="1" spcCol="1270" anchor="ctr" anchorCtr="0">
-          <a:noAutofit/>
-        </a:bodyPr>
-        <a:lstStyle/>
-        <a:p>
-          <a:pPr lvl="0" algn="ctr" defTabSz="488950">
-            <a:lnSpc>
-              <a:spcPct val="90000"/>
-            </a:lnSpc>
-            <a:spcBef>
-              <a:spcPct val="0"/>
-            </a:spcBef>
-            <a:spcAft>
-              <a:spcPct val="35000"/>
-            </a:spcAft>
-          </a:pPr>
-          <a:endParaRPr lang="de-DE" sz="1100" kern="1200"/>
-        </a:p>
-      </dsp:txBody>
-      <dsp:txXfrm>
-        <a:off x="2746392" y="1114362"/>
-        <a:ext cx="162877" cy="163315"/>
-      </dsp:txXfrm>
-    </dsp:sp>
-    <dsp:sp modelId="{70EE9B54-86A5-444C-8714-E159858EC775}">
-      <dsp:nvSpPr>
-        <dsp:cNvPr id="0" name=""/>
-        <dsp:cNvSpPr/>
-      </dsp:nvSpPr>
-      <dsp:spPr>
-        <a:xfrm>
-          <a:off x="3075658" y="866754"/>
-          <a:ext cx="1097552" cy="658531"/>
-        </a:xfrm>
-        <a:prstGeom prst="roundRect">
-          <a:avLst>
-            <a:gd name="adj" fmla="val 10000"/>
-          </a:avLst>
-        </a:prstGeom>
-        <a:solidFill>
-          <a:schemeClr val="accent4">
-            <a:hueOff val="0"/>
-            <a:satOff val="0"/>
-            <a:lumOff val="0"/>
-            <a:alphaOff val="0"/>
-          </a:schemeClr>
-        </a:solidFill>
-        <a:ln w="25400" cap="flat" cmpd="sng" algn="ctr">
-          <a:solidFill>
-            <a:schemeClr val="lt1">
-              <a:hueOff val="0"/>
-              <a:satOff val="0"/>
-              <a:lumOff val="0"/>
-              <a:alphaOff val="0"/>
-            </a:schemeClr>
-          </a:solidFill>
-          <a:prstDash val="solid"/>
-        </a:ln>
-        <a:effectLst/>
-      </dsp:spPr>
-      <dsp:style>
-        <a:lnRef idx="2">
-          <a:scrgbClr r="0" g="0" b="0"/>
-        </a:lnRef>
-        <a:fillRef idx="1">
-          <a:scrgbClr r="0" g="0" b="0"/>
-        </a:fillRef>
-        <a:effectRef idx="0">
-          <a:scrgbClr r="0" g="0" b="0"/>
-        </a:effectRef>
-        <a:fontRef idx="minor">
-          <a:schemeClr val="lt1"/>
-        </a:fontRef>
-      </dsp:style>
-      <dsp:txBody>
-        <a:bodyPr spcFirstLastPara="0" vert="horz" wrap="square" lIns="80010" tIns="80010" rIns="80010" bIns="80010" numCol="1" spcCol="1270" anchor="ctr" anchorCtr="0">
-          <a:noAutofit/>
-        </a:bodyPr>
-        <a:lstStyle/>
-        <a:p>
-          <a:pPr lvl="0" algn="ctr" defTabSz="933450">
-            <a:lnSpc>
-              <a:spcPct val="90000"/>
-            </a:lnSpc>
-            <a:spcBef>
-              <a:spcPct val="0"/>
-            </a:spcBef>
-            <a:spcAft>
-              <a:spcPct val="35000"/>
-            </a:spcAft>
-          </a:pPr>
-          <a:r>
-            <a:rPr lang="de-DE" sz="2100" kern="1200" dirty="0"/>
-            <a:t>Push</a:t>
-          </a:r>
-        </a:p>
-      </dsp:txBody>
-      <dsp:txXfrm>
-        <a:off x="3094946" y="886042"/>
-        <a:ext cx="1058976" cy="619955"/>
-      </dsp:txXfrm>
-    </dsp:sp>
-    <dsp:sp modelId="{BD4DA370-4A8D-42FD-8D2C-CBBB72C7B924}">
-      <dsp:nvSpPr>
-        <dsp:cNvPr id="0" name=""/>
-        <dsp:cNvSpPr/>
-      </dsp:nvSpPr>
-      <dsp:spPr>
-        <a:xfrm>
-          <a:off x="4282966" y="1059923"/>
-          <a:ext cx="232681" cy="272193"/>
-        </a:xfrm>
-        <a:prstGeom prst="rightArrow">
-          <a:avLst>
-            <a:gd name="adj1" fmla="val 60000"/>
-            <a:gd name="adj2" fmla="val 50000"/>
-          </a:avLst>
-        </a:prstGeom>
-        <a:solidFill>
-          <a:schemeClr val="accent4">
-            <a:hueOff val="0"/>
-            <a:satOff val="0"/>
-            <a:lumOff val="0"/>
-            <a:alphaOff val="0"/>
-          </a:schemeClr>
-        </a:solidFill>
-        <a:ln>
-          <a:noFill/>
-        </a:ln>
-        <a:effectLst/>
-      </dsp:spPr>
-      <dsp:style>
-        <a:lnRef idx="0">
-          <a:scrgbClr r="0" g="0" b="0"/>
-        </a:lnRef>
-        <a:fillRef idx="1">
-          <a:scrgbClr r="0" g="0" b="0"/>
-        </a:fillRef>
-        <a:effectRef idx="0">
-          <a:scrgbClr r="0" g="0" b="0"/>
-        </a:effectRef>
-        <a:fontRef idx="minor">
-          <a:schemeClr val="lt1"/>
-        </a:fontRef>
-      </dsp:style>
-      <dsp:txBody>
-        <a:bodyPr spcFirstLastPara="0" vert="horz" wrap="square" lIns="0" tIns="0" rIns="0" bIns="0" numCol="1" spcCol="1270" anchor="ctr" anchorCtr="0">
-          <a:noAutofit/>
-        </a:bodyPr>
-        <a:lstStyle/>
-        <a:p>
-          <a:pPr lvl="0" algn="ctr" defTabSz="488950">
-            <a:lnSpc>
-              <a:spcPct val="90000"/>
-            </a:lnSpc>
-            <a:spcBef>
-              <a:spcPct val="0"/>
-            </a:spcBef>
-            <a:spcAft>
-              <a:spcPct val="35000"/>
-            </a:spcAft>
-          </a:pPr>
-          <a:endParaRPr lang="de-DE" sz="1100" kern="1200"/>
-        </a:p>
-      </dsp:txBody>
-      <dsp:txXfrm>
-        <a:off x="4282966" y="1114362"/>
-        <a:ext cx="162877" cy="163315"/>
-      </dsp:txXfrm>
-    </dsp:sp>
-    <dsp:sp modelId="{DA3328A8-C5B9-45AD-9E20-082A0FF5549E}">
-      <dsp:nvSpPr>
-        <dsp:cNvPr id="0" name=""/>
-        <dsp:cNvSpPr/>
-      </dsp:nvSpPr>
-      <dsp:spPr>
-        <a:xfrm>
-          <a:off x="4612232" y="866754"/>
-          <a:ext cx="1097552" cy="658531"/>
-        </a:xfrm>
-        <a:prstGeom prst="roundRect">
-          <a:avLst>
-            <a:gd name="adj" fmla="val 10000"/>
-          </a:avLst>
-        </a:prstGeom>
-        <a:solidFill>
-          <a:schemeClr val="accent5">
-            <a:hueOff val="0"/>
-            <a:satOff val="0"/>
-            <a:lumOff val="0"/>
-            <a:alphaOff val="0"/>
-          </a:schemeClr>
-        </a:solidFill>
-        <a:ln w="25400" cap="flat" cmpd="sng" algn="ctr">
-          <a:solidFill>
-            <a:schemeClr val="lt1">
-              <a:hueOff val="0"/>
-              <a:satOff val="0"/>
-              <a:lumOff val="0"/>
-              <a:alphaOff val="0"/>
-            </a:schemeClr>
-          </a:solidFill>
-          <a:prstDash val="solid"/>
-        </a:ln>
-        <a:effectLst/>
-      </dsp:spPr>
-      <dsp:style>
-        <a:lnRef idx="2">
-          <a:scrgbClr r="0" g="0" b="0"/>
-        </a:lnRef>
-        <a:fillRef idx="1">
-          <a:scrgbClr r="0" g="0" b="0"/>
-        </a:fillRef>
-        <a:effectRef idx="0">
-          <a:scrgbClr r="0" g="0" b="0"/>
-        </a:effectRef>
-        <a:fontRef idx="minor">
-          <a:schemeClr val="lt1"/>
-        </a:fontRef>
-      </dsp:style>
-      <dsp:txBody>
-        <a:bodyPr spcFirstLastPara="0" vert="horz" wrap="square" lIns="80010" tIns="80010" rIns="80010" bIns="80010" numCol="1" spcCol="1270" anchor="ctr" anchorCtr="0">
-          <a:noAutofit/>
-        </a:bodyPr>
-        <a:lstStyle/>
-        <a:p>
-          <a:pPr lvl="0" algn="ctr" defTabSz="933450">
-            <a:lnSpc>
-              <a:spcPct val="90000"/>
-            </a:lnSpc>
-            <a:spcBef>
-              <a:spcPct val="0"/>
-            </a:spcBef>
-            <a:spcAft>
-              <a:spcPct val="35000"/>
-            </a:spcAft>
-          </a:pPr>
-          <a:r>
-            <a:rPr lang="de-DE" sz="2100" kern="1200" dirty="0"/>
-            <a:t>Pull </a:t>
-          </a:r>
-        </a:p>
-      </dsp:txBody>
-      <dsp:txXfrm>
-        <a:off x="4631520" y="886042"/>
-        <a:ext cx="1058976" cy="619955"/>
-      </dsp:txXfrm>
-    </dsp:sp>
   </dsp:spTree>
 </dsp:drawing>
 </file>
@@ -3205,7 +2689,7 @@
           <a:p>
             <a:fld id="{7E436BCD-359F-4F5B-AF29-33BFD393DED6}" type="datetimeFigureOut">
               <a:rPr lang="de-DE" smtClean="0"/>
-              <a:t>25.04.2017</a:t>
+              <a:t>26.04.2017</a:t>
             </a:fld>
             <a:endParaRPr lang="de-DE"/>
           </a:p>
@@ -3722,7 +3206,7 @@
           <a:p>
             <a:fld id="{D2120015-59FA-4CBB-A73E-96D203871599}" type="datetime1">
               <a:rPr lang="en-US" smtClean="0"/>
-              <a:t>4/25/2017</a:t>
+              <a:t>4/26/2017</a:t>
             </a:fld>
             <a:endParaRPr lang="en-US"/>
           </a:p>
@@ -3886,7 +3370,7 @@
           <a:p>
             <a:fld id="{10AC991D-F0B1-42D5-97D4-41D194E9199B}" type="datetime1">
               <a:rPr lang="en-US" smtClean="0"/>
-              <a:t>4/25/2017</a:t>
+              <a:t>4/26/2017</a:t>
             </a:fld>
             <a:endParaRPr lang="en-US"/>
           </a:p>
@@ -4060,7 +3544,7 @@
           <a:p>
             <a:fld id="{42137697-710B-4943-96D3-CD38FFC239FE}" type="datetime1">
               <a:rPr lang="en-US" smtClean="0"/>
-              <a:t>4/25/2017</a:t>
+              <a:t>4/26/2017</a:t>
             </a:fld>
             <a:endParaRPr lang="en-US"/>
           </a:p>
@@ -4224,7 +3708,7 @@
           <a:p>
             <a:fld id="{78389C1C-CB28-4C14-BEE1-33EACFE7E59F}" type="datetime1">
               <a:rPr lang="en-US" smtClean="0"/>
-              <a:t>4/25/2017</a:t>
+              <a:t>4/26/2017</a:t>
             </a:fld>
             <a:endParaRPr lang="en-US"/>
           </a:p>
@@ -4460,7 +3944,7 @@
           <a:p>
             <a:fld id="{2E29CB96-26CF-47E2-AA7E-562E6C8E1E4B}" type="datetime1">
               <a:rPr lang="en-US" smtClean="0"/>
-              <a:t>4/25/2017</a:t>
+              <a:t>4/26/2017</a:t>
             </a:fld>
             <a:endParaRPr lang="en-US"/>
           </a:p>
@@ -4723,7 +4207,7 @@
           <a:p>
             <a:fld id="{E6983B90-856A-4778-8586-8ACA210666E7}" type="datetime1">
               <a:rPr lang="en-US" smtClean="0"/>
-              <a:t>4/25/2017</a:t>
+              <a:t>4/26/2017</a:t>
             </a:fld>
             <a:endParaRPr lang="en-US"/>
           </a:p>
@@ -5100,7 +4584,7 @@
           <a:p>
             <a:fld id="{2001E5A1-68B1-46B0-B349-E67996EE978B}" type="datetime1">
               <a:rPr lang="en-US" smtClean="0"/>
-              <a:t>4/25/2017</a:t>
+              <a:t>4/26/2017</a:t>
             </a:fld>
             <a:endParaRPr lang="en-US"/>
           </a:p>
@@ -5249,7 +4733,7 @@
           <a:p>
             <a:fld id="{78E67761-76F5-4696-991B-2C4661EDCA10}" type="datetime1">
               <a:rPr lang="en-US" smtClean="0"/>
-              <a:t>4/25/2017</a:t>
+              <a:t>4/26/2017</a:t>
             </a:fld>
             <a:endParaRPr lang="en-US"/>
           </a:p>
@@ -5339,7 +4823,7 @@
           <a:p>
             <a:fld id="{25482746-14B6-4A52-BC66-7BBA9E034619}" type="datetime1">
               <a:rPr lang="en-US" smtClean="0"/>
-              <a:t>4/25/2017</a:t>
+              <a:t>4/26/2017</a:t>
             </a:fld>
             <a:endParaRPr lang="en-US"/>
           </a:p>
@@ -5599,7 +5083,7 @@
           <a:p>
             <a:fld id="{C9236A67-E7DA-4FF7-A778-CDA8D1037A02}" type="datetime1">
               <a:rPr lang="en-US" smtClean="0"/>
-              <a:t>4/25/2017</a:t>
+              <a:t>4/26/2017</a:t>
             </a:fld>
             <a:endParaRPr lang="en-US"/>
           </a:p>
@@ -5886,7 +5370,7 @@
           <a:p>
             <a:fld id="{9A756F8F-BD89-4F4B-80DF-B6260262DF76}" type="datetime1">
               <a:rPr lang="en-US" smtClean="0"/>
-              <a:t>4/25/2017</a:t>
+              <a:t>4/26/2017</a:t>
             </a:fld>
             <a:endParaRPr lang="en-US"/>
           </a:p>
@@ -6655,7 +6139,7 @@
           <a:p>
             <a:fld id="{6B312904-D267-4574-B176-660BC2BB2A8B}" type="datetime1">
               <a:rPr lang="en-US" smtClean="0"/>
-              <a:t>4/25/2017</a:t>
+              <a:t>4/26/2017</a:t>
             </a:fld>
             <a:endParaRPr lang="en-US"/>
           </a:p>
@@ -8992,11 +8476,7 @@
             <a:pPr lvl="2"/>
             <a:r>
               <a:rPr lang="de-DE" u="dotted" dirty="0" smtClean="0"/>
-              <a:t>Nicht-Lineare </a:t>
-            </a:r>
-            <a:r>
-              <a:rPr lang="de-DE" u="dotted" dirty="0" smtClean="0"/>
-              <a:t>Entwicklung</a:t>
+              <a:t>Nicht-Lineare Entwicklung</a:t>
             </a:r>
           </a:p>
           <a:p>
@@ -9473,7 +8953,6 @@
               <a:rPr lang="de-DE" dirty="0"/>
               <a:t> </a:t>
             </a:r>
-            <a:endParaRPr lang="de-DE" dirty="0"/>
           </a:p>
           <a:p>
             <a:pPr lvl="2"/>
@@ -15097,11 +14576,7 @@
             <a:pPr lvl="1"/>
             <a:r>
               <a:rPr lang="de-DE" dirty="0" smtClean="0"/>
-              <a:t>Projektmanagement </a:t>
-            </a:r>
-            <a:r>
-              <a:rPr lang="de-DE" dirty="0" smtClean="0"/>
-              <a:t>Features</a:t>
+              <a:t>Projektmanagement Features</a:t>
             </a:r>
             <a:endParaRPr lang="de-DE" dirty="0"/>
           </a:p>
@@ -16556,7 +16031,6 @@
               <a:rPr lang="de-DE" dirty="0" smtClean="0"/>
               <a:t>Wiki</a:t>
             </a:r>
-            <a:endParaRPr lang="de-DE" dirty="0" smtClean="0"/>
           </a:p>
           <a:p>
             <a:pPr lvl="1"/>
@@ -19504,22 +18978,14 @@
             </a:r>
             <a:r>
               <a:rPr lang="de-DE" u="dotted" dirty="0" smtClean="0"/>
-              <a:t>a</a:t>
-            </a:r>
-            <a:r>
-              <a:rPr lang="de-DE" u="dotted" dirty="0" smtClean="0"/>
-              <a:t>giler Softwareentwicklung</a:t>
+              <a:t>agiler Softwareentwicklung</a:t>
             </a:r>
           </a:p>
           <a:p>
             <a:pPr lvl="1"/>
             <a:r>
               <a:rPr lang="de-DE" dirty="0" smtClean="0"/>
-              <a:t>CI = Softwareentwicklungsmethode</a:t>
-            </a:r>
-            <a:r>
-              <a:rPr lang="de-DE" dirty="0" smtClean="0"/>
-              <a:t>, die durch hohe Integrationsfrequenz und angeschlossene </a:t>
+              <a:t>CI = Softwareentwicklungsmethode, die durch hohe Integrationsfrequenz und angeschlossene </a:t>
             </a:r>
             <a:r>
               <a:rPr lang="de-DE" u="dotted" dirty="0" smtClean="0"/>
@@ -20784,7 +20250,6 @@
               <a:rPr lang="de-DE" u="dotted" dirty="0" smtClean="0"/>
               <a:t> </a:t>
             </a:r>
-            <a:endParaRPr lang="de-DE" u="dotted" dirty="0" smtClean="0"/>
           </a:p>
           <a:p>
             <a:r>
@@ -24930,35 +24395,6 @@
       </p:grpSpPr>
       <p:sp>
         <p:nvSpPr>
-          <p:cNvPr id="2" name="Title 1"/>
-          <p:cNvSpPr>
-            <a:spLocks noGrp="1"/>
-          </p:cNvSpPr>
-          <p:nvPr>
-            <p:ph type="title"/>
-          </p:nvPr>
-        </p:nvSpPr>
-        <p:spPr>
-          <a:xfrm>
-            <a:off x="457200" y="704088"/>
-            <a:ext cx="8363272" cy="1143000"/>
-          </a:xfrm>
-        </p:spPr>
-        <p:txBody>
-          <a:bodyPr>
-            <a:normAutofit/>
-          </a:bodyPr>
-          <a:lstStyle/>
-          <a:p>
-            <a:r>
-              <a:rPr lang="en-US" dirty="0"/>
-              <a:t>SHA1-Prüfsummen</a:t>
-            </a:r>
-          </a:p>
-        </p:txBody>
-      </p:sp>
-      <p:sp>
-        <p:nvSpPr>
           <p:cNvPr id="3" name="Content Placeholder 2"/>
           <p:cNvSpPr>
             <a:spLocks noGrp="1"/>
@@ -24969,8 +24405,8 @@
         </p:nvSpPr>
         <p:spPr>
           <a:xfrm>
-            <a:off x="457200" y="1935480"/>
-            <a:ext cx="8229600" cy="4517856"/>
+            <a:off x="457200" y="1772816"/>
+            <a:ext cx="8229600" cy="4922521"/>
           </a:xfrm>
         </p:spPr>
         <p:txBody>
@@ -24979,79 +24415,106 @@
           </a:bodyPr>
           <a:lstStyle/>
           <a:p>
-            <a:pPr lvl="1"/>
-            <a:r>
-              <a:rPr lang="de-DE" dirty="0"/>
-              <a:t>Prüfsummen Funktion</a:t>
-            </a:r>
-          </a:p>
-          <a:p>
-            <a:pPr lvl="1"/>
-            <a:r>
-              <a:rPr lang="de-DE" dirty="0"/>
-              <a:t>Aus beliebigen Datenblöcken Prüfwerte bildbar (bei </a:t>
-            </a:r>
-            <a:r>
-              <a:rPr lang="de-DE" dirty="0" err="1"/>
-              <a:t>Git</a:t>
-            </a:r>
-            <a:r>
-              <a:rPr lang="de-DE" dirty="0"/>
-              <a:t> auf Basis aller Daten – Inhalten der Dateien, Autor und Zeitpunkt)</a:t>
-            </a:r>
-          </a:p>
-          <a:p>
-            <a:pPr lvl="1"/>
-            <a:r>
-              <a:rPr lang="de-DE" dirty="0"/>
-              <a:t>Durch den Vergleich von Prüfwerten bei Sender und Empfänger wird sichergestellt, dass Nachrichten unverändert ankommen</a:t>
-            </a:r>
-          </a:p>
-          <a:p>
-            <a:pPr lvl="1"/>
-            <a:r>
-              <a:rPr lang="de-DE" dirty="0"/>
-              <a:t>ABER: es gibt mehrere Ausgangszahlen die die gleiche </a:t>
-            </a:r>
-            <a:r>
-              <a:rPr lang="de-DE" dirty="0" err="1"/>
-              <a:t>Prüfzahl</a:t>
-            </a:r>
-            <a:r>
-              <a:rPr lang="de-DE" dirty="0"/>
-              <a:t> ergeben -&gt; ist an sich geknackt</a:t>
-            </a:r>
-          </a:p>
-          <a:p>
-            <a:pPr lvl="1"/>
-            <a:endParaRPr lang="de-DE" dirty="0"/>
-          </a:p>
-          <a:p>
-            <a:pPr marL="393192" lvl="1" indent="0">
+            <a:pPr marL="393192" lvl="1" indent="0" algn="ctr">
               <a:buNone/>
             </a:pPr>
             <a:endParaRPr lang="de-DE" dirty="0"/>
           </a:p>
           <a:p>
+            <a:pPr lvl="2"/>
+            <a:endParaRPr lang="de-DE" dirty="0" smtClean="0"/>
+          </a:p>
+          <a:p>
+            <a:pPr lvl="2"/>
+            <a:endParaRPr lang="de-DE" dirty="0"/>
+          </a:p>
+          <a:p>
+            <a:pPr lvl="2"/>
+            <a:endParaRPr lang="de-DE" dirty="0" smtClean="0"/>
+          </a:p>
+          <a:p>
+            <a:pPr lvl="2"/>
+            <a:endParaRPr lang="de-DE" dirty="0"/>
+          </a:p>
+          <a:p>
+            <a:pPr lvl="2"/>
+            <a:endParaRPr lang="de-DE" dirty="0" smtClean="0"/>
+          </a:p>
+          <a:p>
+            <a:pPr lvl="2"/>
+            <a:endParaRPr lang="de-DE" dirty="0"/>
+          </a:p>
+          <a:p>
+            <a:pPr lvl="2"/>
+            <a:endParaRPr lang="de-DE" dirty="0" smtClean="0"/>
+          </a:p>
+          <a:p>
+            <a:pPr lvl="2"/>
+            <a:endParaRPr lang="de-DE" dirty="0"/>
+          </a:p>
+          <a:p>
+            <a:pPr lvl="2"/>
+            <a:endParaRPr lang="de-DE" dirty="0" smtClean="0"/>
+          </a:p>
+          <a:p>
+            <a:pPr lvl="2"/>
+            <a:endParaRPr lang="de-DE" dirty="0"/>
+          </a:p>
+          <a:p>
+            <a:pPr lvl="2"/>
+            <a:endParaRPr lang="de-DE" dirty="0" smtClean="0"/>
+          </a:p>
+          <a:p>
+            <a:pPr marL="667512" lvl="2" indent="0" algn="ctr">
+              <a:buNone/>
+            </a:pPr>
+            <a:r>
+              <a:rPr lang="de-DE" sz="1100" dirty="0"/>
+              <a:t>https://9gag.com/gag/a0bwDAB?ref=ios.s.others</a:t>
+            </a:r>
+          </a:p>
+          <a:p>
+            <a:pPr lvl="2"/>
+            <a:endParaRPr lang="de-DE" dirty="0"/>
+          </a:p>
+          <a:p>
+            <a:pPr lvl="2"/>
+            <a:endParaRPr lang="de-DE" dirty="0"/>
+          </a:p>
+          <a:p>
+            <a:pPr lvl="2"/>
+            <a:endParaRPr lang="de-DE" dirty="0"/>
+          </a:p>
+          <a:p>
+            <a:pPr lvl="2"/>
+            <a:endParaRPr lang="de-DE" dirty="0"/>
+          </a:p>
+          <a:p>
+            <a:pPr lvl="2"/>
+            <a:endParaRPr lang="de-DE" dirty="0"/>
+          </a:p>
+          <a:p>
+            <a:pPr lvl="2"/>
+            <a:endParaRPr lang="de-DE" dirty="0"/>
+          </a:p>
+          <a:p>
+            <a:pPr lvl="2"/>
+            <a:endParaRPr lang="de-DE" dirty="0"/>
+          </a:p>
+          <a:p>
             <a:pPr lvl="1"/>
             <a:endParaRPr lang="de-DE" dirty="0"/>
           </a:p>
           <a:p>
-            <a:pPr lvl="1"/>
-            <a:endParaRPr lang="de-DE" dirty="0"/>
-          </a:p>
-          <a:p>
-            <a:endParaRPr lang="de-DE" dirty="0"/>
-          </a:p>
-          <a:p>
-            <a:endParaRPr lang="de-DE" dirty="0"/>
-          </a:p>
-          <a:p>
-            <a:pPr lvl="1"/>
-            <a:endParaRPr lang="de-DE" dirty="0"/>
-          </a:p>
-          <a:p>
-            <a:pPr lvl="1"/>
+            <a:pPr lvl="2"/>
+            <a:endParaRPr lang="de-DE" dirty="0"/>
+          </a:p>
+          <a:p>
+            <a:pPr lvl="2"/>
+            <a:endParaRPr lang="de-DE" dirty="0"/>
+          </a:p>
+          <a:p>
+            <a:pPr lvl="2"/>
             <a:endParaRPr lang="de-DE" dirty="0"/>
           </a:p>
         </p:txBody>
@@ -25079,23 +24542,97 @@
           </a:p>
         </p:txBody>
       </p:sp>
+      <p:pic>
+        <p:nvPicPr>
+          <p:cNvPr id="1026" name="Picture 2" descr="I like to see the world burn."/>
+          <p:cNvPicPr>
+            <a:picLocks noChangeAspect="1" noChangeArrowheads="1"/>
+          </p:cNvPicPr>
+          <p:nvPr/>
+        </p:nvPicPr>
+        <p:blipFill>
+          <a:blip r:embed="rId2">
+            <a:extLst>
+              <a:ext uri="{28A0092B-C50C-407E-A947-70E740481C1C}">
+                <a14:useLocalDpi xmlns:a14="http://schemas.microsoft.com/office/drawing/2010/main" val="0"/>
+              </a:ext>
+            </a:extLst>
+          </a:blip>
+          <a:srcRect/>
+          <a:stretch>
+            <a:fillRect/>
+          </a:stretch>
+        </p:blipFill>
+        <p:spPr bwMode="auto">
+          <a:xfrm>
+            <a:off x="2123728" y="1818332"/>
+            <a:ext cx="6048345" cy="4521139"/>
+          </a:xfrm>
+          <a:prstGeom prst="rect">
+            <a:avLst/>
+          </a:prstGeom>
+          <a:noFill/>
+          <a:extLst>
+            <a:ext uri="{909E8E84-426E-40DD-AFC4-6F175D3DCCD1}">
+              <a14:hiddenFill xmlns:a14="http://schemas.microsoft.com/office/drawing/2010/main">
+                <a:solidFill>
+                  <a:srgbClr val="FFFFFF"/>
+                </a:solidFill>
+              </a14:hiddenFill>
+            </a:ext>
+          </a:extLst>
+        </p:spPr>
+      </p:pic>
+      <p:sp>
+        <p:nvSpPr>
+          <p:cNvPr id="2" name="Rechteck 1"/>
+          <p:cNvSpPr/>
+          <p:nvPr/>
+        </p:nvSpPr>
+        <p:spPr>
+          <a:xfrm>
+            <a:off x="457200" y="980728"/>
+            <a:ext cx="6135013" cy="646331"/>
+          </a:xfrm>
+          <a:prstGeom prst="rect">
+            <a:avLst/>
+          </a:prstGeom>
+        </p:spPr>
+        <p:txBody>
+          <a:bodyPr wrap="none">
+            <a:spAutoFit/>
+          </a:bodyPr>
+          <a:lstStyle/>
+          <a:p>
+            <a:r>
+              <a:rPr lang="en-US" sz="3600" b="1" dirty="0">
+                <a:solidFill>
+                  <a:srgbClr val="000000"/>
+                </a:solidFill>
+                <a:latin typeface="-apple-system"/>
+              </a:rPr>
+              <a:t>I like to see the world burn.</a:t>
+            </a:r>
+            <a:endParaRPr lang="en-US" sz="3600" b="1" i="0" dirty="0">
+              <a:solidFill>
+                <a:srgbClr val="000000"/>
+              </a:solidFill>
+              <a:effectLst/>
+              <a:latin typeface="-apple-system"/>
+            </a:endParaRPr>
+          </a:p>
+        </p:txBody>
+      </p:sp>
     </p:spTree>
     <p:extLst>
       <p:ext uri="{BB962C8B-B14F-4D97-AF65-F5344CB8AC3E}">
-        <p14:creationId xmlns:p14="http://schemas.microsoft.com/office/powerpoint/2010/main" val="3385004501"/>
+        <p14:creationId xmlns:p14="http://schemas.microsoft.com/office/powerpoint/2010/main" val="961996684"/>
       </p:ext>
     </p:extLst>
   </p:cSld>
   <p:clrMapOvr>
     <a:masterClrMapping/>
   </p:clrMapOvr>
-  <p:timing>
-    <p:tnLst>
-      <p:par>
-        <p:cTn id="1" dur="indefinite" restart="never" nodeType="tmRoot"/>
-      </p:par>
-    </p:tnLst>
-  </p:timing>
 </p:sld>
 </file>
 
@@ -25517,10 +25054,9 @@
           <a:lstStyle/>
           <a:p>
             <a:r>
-              <a:rPr lang="de-DE" sz="5400" dirty="0"/>
-              <a:t>GNU GPLv2 Lizenz</a:t>
-            </a:r>
-            <a:endParaRPr lang="en-US" dirty="0"/>
+              <a:rPr lang="en-US" dirty="0"/>
+              <a:t>SHA1-Prüfsummen</a:t>
+            </a:r>
           </a:p>
         </p:txBody>
       </p:sp>
@@ -25549,63 +25085,48 @@
             <a:pPr lvl="1"/>
             <a:r>
               <a:rPr lang="de-DE" dirty="0"/>
-              <a:t>GNU GPL: </a:t>
-            </a:r>
-          </a:p>
-          <a:p>
-            <a:pPr lvl="2"/>
+              <a:t>Prüfsummen Funktion</a:t>
+            </a:r>
+          </a:p>
+          <a:p>
+            <a:pPr lvl="1"/>
             <a:r>
               <a:rPr lang="de-DE" dirty="0"/>
-              <a:t>Erlaubt Software auszuführen, zu studieren, zu ändern und zu verbreiten</a:t>
-            </a:r>
-          </a:p>
-          <a:p>
-            <a:pPr lvl="2"/>
+              <a:t>Aus beliebigen Datenblöcken Prüfwerte bildbar (bei </a:t>
+            </a:r>
+            <a:r>
+              <a:rPr lang="de-DE" dirty="0" err="1"/>
+              <a:t>Git</a:t>
+            </a:r>
             <a:r>
               <a:rPr lang="de-DE" dirty="0"/>
-              <a:t>-&gt; Freie Software</a:t>
-            </a:r>
-          </a:p>
-          <a:p>
-            <a:pPr lvl="2"/>
+              <a:t> auf Basis aller Daten – Inhalten der Dateien, Autor und Zeitpunkt)</a:t>
+            </a:r>
+          </a:p>
+          <a:p>
+            <a:pPr lvl="1"/>
             <a:r>
               <a:rPr lang="de-DE" dirty="0"/>
-              <a:t>Falls Software einem </a:t>
+              <a:t>Durch den Vergleich von Prüfwerten bei Sender und Empfänger wird sichergestellt, dass Nachrichten unverändert ankommen</a:t>
+            </a:r>
+          </a:p>
+          <a:p>
+            <a:pPr lvl="1"/>
+            <a:r>
+              <a:rPr lang="de-DE" dirty="0"/>
+              <a:t>ABER: es gibt mehrere Ausgangszahlen die die gleiche </a:t>
             </a:r>
             <a:r>
               <a:rPr lang="de-DE" dirty="0" err="1"/>
-              <a:t>Copyleft</a:t>
+              <a:t>Prüfzahl</a:t>
             </a:r>
             <a:r>
               <a:rPr lang="de-DE" dirty="0"/>
-              <a:t> unterliegt, müssen diese Rechte bei Weitergabe beibehalten werden</a:t>
-            </a:r>
-          </a:p>
-          <a:p>
-            <a:pPr lvl="2"/>
-            <a:r>
-              <a:rPr lang="de-DE" dirty="0"/>
-              <a:t>„Liberty </a:t>
-            </a:r>
-            <a:r>
-              <a:rPr lang="de-DE" dirty="0" err="1"/>
-              <a:t>or</a:t>
-            </a:r>
-            <a:r>
-              <a:rPr lang="de-DE" dirty="0"/>
-              <a:t> Death“-Klausel: Diese besagt, wenn es nicht möglich ist, einige Bedingungen der GNU GPL einzuhalten – beispielsweise wegen eines Gerichtsurteils – es untersagt ist, diese Lizenz nur bestmöglich zu erfüllen. In diesem Fall ist es also überhaupt nicht mehr möglich, die Software zu verbreiten.</a:t>
-            </a:r>
-          </a:p>
-          <a:p>
-            <a:pPr lvl="2"/>
-            <a:r>
-              <a:rPr lang="de-DE" dirty="0"/>
-              <a:t>Paragraph 8: Gültigkeit für einzelne Länder </a:t>
-            </a:r>
-            <a:r>
-              <a:rPr lang="de-DE" dirty="0" err="1"/>
-              <a:t>auschließbar</a:t>
-            </a:r>
+              <a:t> ergeben -&gt; ist an sich geknackt</a:t>
+            </a:r>
+          </a:p>
+          <a:p>
+            <a:pPr lvl="1"/>
             <a:endParaRPr lang="de-DE" dirty="0"/>
           </a:p>
           <a:p>
@@ -25664,7 +25185,7 @@
     </p:spTree>
     <p:extLst>
       <p:ext uri="{BB962C8B-B14F-4D97-AF65-F5344CB8AC3E}">
-        <p14:creationId xmlns:p14="http://schemas.microsoft.com/office/powerpoint/2010/main" val="3258573018"/>
+        <p14:creationId xmlns:p14="http://schemas.microsoft.com/office/powerpoint/2010/main" val="3385004501"/>
       </p:ext>
     </p:extLst>
   </p:cSld>
@@ -25708,7 +25229,12 @@
             <p:ph type="title"/>
           </p:nvPr>
         </p:nvSpPr>
-        <p:spPr/>
+        <p:spPr>
+          <a:xfrm>
+            <a:off x="457200" y="704088"/>
+            <a:ext cx="8363272" cy="1143000"/>
+          </a:xfrm>
+        </p:spPr>
         <p:txBody>
           <a:bodyPr>
             <a:normAutofit/>
@@ -25716,8 +25242,8 @@
           <a:lstStyle/>
           <a:p>
             <a:r>
-              <a:rPr lang="en-US" dirty="0" err="1"/>
-              <a:t>Versionsverwaltungssysteme</a:t>
+              <a:rPr lang="de-DE" sz="5400" dirty="0"/>
+              <a:t>GNU GPLv2 Lizenz</a:t>
             </a:r>
             <a:endParaRPr lang="en-US" dirty="0"/>
           </a:p>
@@ -25733,7 +25259,12 @@
             <p:ph idx="1"/>
           </p:nvPr>
         </p:nvSpPr>
-        <p:spPr/>
+        <p:spPr>
+          <a:xfrm>
+            <a:off x="457200" y="1935480"/>
+            <a:ext cx="8229600" cy="4517856"/>
+          </a:xfrm>
+        </p:spPr>
         <p:txBody>
           <a:bodyPr>
             <a:normAutofit/>
@@ -25743,121 +25274,91 @@
             <a:pPr lvl="1"/>
             <a:r>
               <a:rPr lang="de-DE" dirty="0"/>
-              <a:t>Jede Revision enthält Metadaten</a:t>
+              <a:t>GNU GPL: </a:t>
             </a:r>
           </a:p>
           <a:p>
             <a:pPr lvl="2"/>
             <a:r>
               <a:rPr lang="de-DE" dirty="0"/>
-              <a:t>Name des Autors</a:t>
+              <a:t>Erlaubt Software auszuführen, zu studieren, zu ändern und zu verbreiten</a:t>
             </a:r>
           </a:p>
           <a:p>
             <a:pPr lvl="2"/>
             <a:r>
               <a:rPr lang="de-DE" dirty="0"/>
-              <a:t>Zeitstempel</a:t>
+              <a:t>-&gt; Freie Software</a:t>
             </a:r>
           </a:p>
           <a:p>
             <a:pPr lvl="2"/>
             <a:r>
               <a:rPr lang="de-DE" dirty="0"/>
-              <a:t>Commit Message</a:t>
-            </a:r>
+              <a:t>Falls Software einem </a:t>
+            </a:r>
+            <a:r>
+              <a:rPr lang="de-DE" dirty="0" err="1"/>
+              <a:t>Copyleft</a:t>
+            </a:r>
+            <a:r>
+              <a:rPr lang="de-DE" dirty="0"/>
+              <a:t> unterliegt, müssen diese Rechte bei Weitergabe beibehalten werden</a:t>
+            </a:r>
+          </a:p>
+          <a:p>
+            <a:pPr lvl="2"/>
+            <a:r>
+              <a:rPr lang="de-DE" dirty="0"/>
+              <a:t>„Liberty </a:t>
+            </a:r>
+            <a:r>
+              <a:rPr lang="de-DE" dirty="0" err="1"/>
+              <a:t>or</a:t>
+            </a:r>
+            <a:r>
+              <a:rPr lang="de-DE" dirty="0"/>
+              <a:t> Death“-Klausel: Diese besagt, wenn es nicht möglich ist, einige Bedingungen der GNU GPL einzuhalten – beispielsweise wegen eines Gerichtsurteils – es untersagt ist, diese Lizenz nur bestmöglich zu erfüllen. In diesem Fall ist es also überhaupt nicht mehr möglich, die Software zu verbreiten.</a:t>
+            </a:r>
+          </a:p>
+          <a:p>
+            <a:pPr lvl="2"/>
+            <a:r>
+              <a:rPr lang="de-DE" dirty="0"/>
+              <a:t>Paragraph 8: Gültigkeit für einzelne Länder </a:t>
+            </a:r>
+            <a:r>
+              <a:rPr lang="de-DE" dirty="0" err="1"/>
+              <a:t>auschließbar</a:t>
+            </a:r>
+            <a:endParaRPr lang="de-DE" dirty="0"/>
+          </a:p>
+          <a:p>
+            <a:pPr marL="393192" lvl="1" indent="0">
+              <a:buNone/>
+            </a:pPr>
+            <a:endParaRPr lang="de-DE" dirty="0"/>
           </a:p>
           <a:p>
             <a:pPr lvl="1"/>
-            <a:r>
-              <a:rPr lang="de-DE" dirty="0"/>
-              <a:t>Zugriff auf das Repository entweder lesend (vor allem bei </a:t>
-            </a:r>
-            <a:r>
-              <a:rPr lang="de-DE" dirty="0" err="1"/>
-              <a:t>OpenSource</a:t>
-            </a:r>
-            <a:r>
-              <a:rPr lang="de-DE" dirty="0"/>
-              <a:t>-Projekten) oder so stark wie möglich eingeschränkt</a:t>
-            </a:r>
+            <a:endParaRPr lang="de-DE" dirty="0"/>
           </a:p>
           <a:p>
             <a:pPr lvl="1"/>
-            <a:r>
-              <a:rPr lang="de-DE" dirty="0"/>
-              <a:t>Schreibender Zugriff kann direkt gewährt werden (Commit-</a:t>
-            </a:r>
-            <a:r>
-              <a:rPr lang="de-DE" dirty="0" err="1"/>
-              <a:t>based</a:t>
-            </a:r>
-            <a:r>
-              <a:rPr lang="de-DE" dirty="0"/>
-              <a:t> </a:t>
-            </a:r>
-            <a:r>
-              <a:rPr lang="de-DE" dirty="0" err="1"/>
-              <a:t>Collaboration</a:t>
-            </a:r>
-            <a:r>
-              <a:rPr lang="de-DE" dirty="0"/>
-              <a:t>) oder indirekt (Patch-</a:t>
-            </a:r>
-            <a:r>
-              <a:rPr lang="de-DE" dirty="0" err="1"/>
-              <a:t>based</a:t>
-            </a:r>
-            <a:r>
-              <a:rPr lang="de-DE" dirty="0"/>
-              <a:t> </a:t>
-            </a:r>
-            <a:r>
-              <a:rPr lang="de-DE" dirty="0" err="1"/>
-              <a:t>Collaboration</a:t>
-            </a:r>
-            <a:r>
-              <a:rPr lang="de-DE" dirty="0"/>
-              <a:t>)</a:t>
-            </a:r>
+            <a:endParaRPr lang="de-DE" dirty="0"/>
+          </a:p>
+          <a:p>
+            <a:endParaRPr lang="de-DE" dirty="0"/>
+          </a:p>
+          <a:p>
+            <a:endParaRPr lang="de-DE" dirty="0"/>
           </a:p>
           <a:p>
             <a:pPr lvl="1"/>
-            <a:r>
-              <a:rPr lang="de-DE" dirty="0"/>
-              <a:t>Unterscheidung zwischen zentralen und dezentralen SCMs</a:t>
-            </a:r>
+            <a:endParaRPr lang="de-DE" dirty="0"/>
           </a:p>
           <a:p>
             <a:pPr lvl="1"/>
-            <a:endParaRPr lang="de-DE" dirty="0"/>
-          </a:p>
-          <a:p>
-            <a:pPr lvl="1"/>
-            <a:endParaRPr lang="de-DE" dirty="0"/>
-          </a:p>
-          <a:p>
-            <a:pPr lvl="2"/>
-            <a:endParaRPr lang="de-DE" dirty="0"/>
-          </a:p>
-          <a:p>
-            <a:pPr lvl="2"/>
-            <a:endParaRPr lang="de-DE" dirty="0"/>
-          </a:p>
-          <a:p>
-            <a:pPr lvl="1"/>
-            <a:endParaRPr lang="de-DE" dirty="0"/>
-          </a:p>
-          <a:p>
-            <a:pPr lvl="2"/>
-            <a:endParaRPr lang="de-DE" dirty="0"/>
-          </a:p>
-          <a:p>
-            <a:pPr lvl="2"/>
-            <a:endParaRPr lang="de-DE" dirty="0"/>
-          </a:p>
-          <a:p>
-            <a:pPr lvl="2"/>
             <a:endParaRPr lang="de-DE" dirty="0"/>
           </a:p>
         </p:txBody>
@@ -25888,475 +25389,17 @@
     </p:spTree>
     <p:extLst>
       <p:ext uri="{BB962C8B-B14F-4D97-AF65-F5344CB8AC3E}">
-        <p14:creationId xmlns:p14="http://schemas.microsoft.com/office/powerpoint/2010/main" val="4006128135"/>
+        <p14:creationId xmlns:p14="http://schemas.microsoft.com/office/powerpoint/2010/main" val="3258573018"/>
       </p:ext>
     </p:extLst>
   </p:cSld>
   <p:clrMapOvr>
     <a:masterClrMapping/>
   </p:clrMapOvr>
-  <mc:AlternateContent xmlns:mc="http://schemas.openxmlformats.org/markup-compatibility/2006">
-    <mc:Choice xmlns:p14="http://schemas.microsoft.com/office/powerpoint/2010/main" Requires="p14">
-      <p:transition spd="slow" p14:dur="2000"/>
-    </mc:Choice>
-    <mc:Fallback>
-      <p:transition spd="slow"/>
-    </mc:Fallback>
-  </mc:AlternateContent>
   <p:timing>
     <p:tnLst>
       <p:par>
-        <p:cTn id="1" dur="indefinite" restart="never" nodeType="tmRoot">
-          <p:childTnLst>
-            <p:seq concurrent="1" nextAc="seek">
-              <p:cTn id="2" dur="indefinite" nodeType="mainSeq">
-                <p:childTnLst>
-                  <p:par>
-                    <p:cTn id="3" fill="hold">
-                      <p:stCondLst>
-                        <p:cond delay="indefinite"/>
-                      </p:stCondLst>
-                      <p:childTnLst>
-                        <p:par>
-                          <p:cTn id="4" fill="hold">
-                            <p:stCondLst>
-                              <p:cond delay="0"/>
-                            </p:stCondLst>
-                            <p:childTnLst>
-                              <p:par>
-                                <p:cTn id="5" presetID="10" presetClass="entr" presetSubtype="0" fill="hold" nodeType="clickEffect">
-                                  <p:stCondLst>
-                                    <p:cond delay="0"/>
-                                  </p:stCondLst>
-                                  <p:childTnLst>
-                                    <p:set>
-                                      <p:cBhvr>
-                                        <p:cTn id="6" dur="1" fill="hold">
-                                          <p:stCondLst>
-                                            <p:cond delay="0"/>
-                                          </p:stCondLst>
-                                        </p:cTn>
-                                        <p:tgtEl>
-                                          <p:spTgt spid="3">
-                                            <p:txEl>
-                                              <p:pRg st="0" end="0"/>
-                                            </p:txEl>
-                                          </p:spTgt>
-                                        </p:tgtEl>
-                                        <p:attrNameLst>
-                                          <p:attrName>style.visibility</p:attrName>
-                                        </p:attrNameLst>
-                                      </p:cBhvr>
-                                      <p:to>
-                                        <p:strVal val="visible"/>
-                                      </p:to>
-                                    </p:set>
-                                    <p:animEffect transition="in" filter="fade">
-                                      <p:cBhvr>
-                                        <p:cTn id="7" dur="500"/>
-                                        <p:tgtEl>
-                                          <p:spTgt spid="3">
-                                            <p:txEl>
-                                              <p:pRg st="0" end="0"/>
-                                            </p:txEl>
-                                          </p:spTgt>
-                                        </p:tgtEl>
-                                      </p:cBhvr>
-                                    </p:animEffect>
-                                  </p:childTnLst>
-                                </p:cTn>
-                              </p:par>
-                            </p:childTnLst>
-                          </p:cTn>
-                        </p:par>
-                      </p:childTnLst>
-                    </p:cTn>
-                  </p:par>
-                  <p:par>
-                    <p:cTn id="8" fill="hold">
-                      <p:stCondLst>
-                        <p:cond delay="indefinite"/>
-                      </p:stCondLst>
-                      <p:childTnLst>
-                        <p:par>
-                          <p:cTn id="9" fill="hold">
-                            <p:stCondLst>
-                              <p:cond delay="0"/>
-                            </p:stCondLst>
-                            <p:childTnLst>
-                              <p:par>
-                                <p:cTn id="10" presetID="10" presetClass="entr" presetSubtype="0" fill="hold" nodeType="clickEffect">
-                                  <p:stCondLst>
-                                    <p:cond delay="0"/>
-                                  </p:stCondLst>
-                                  <p:childTnLst>
-                                    <p:set>
-                                      <p:cBhvr>
-                                        <p:cTn id="11" dur="1" fill="hold">
-                                          <p:stCondLst>
-                                            <p:cond delay="0"/>
-                                          </p:stCondLst>
-                                        </p:cTn>
-                                        <p:tgtEl>
-                                          <p:spTgt spid="3">
-                                            <p:txEl>
-                                              <p:pRg st="1" end="1"/>
-                                            </p:txEl>
-                                          </p:spTgt>
-                                        </p:tgtEl>
-                                        <p:attrNameLst>
-                                          <p:attrName>style.visibility</p:attrName>
-                                        </p:attrNameLst>
-                                      </p:cBhvr>
-                                      <p:to>
-                                        <p:strVal val="visible"/>
-                                      </p:to>
-                                    </p:set>
-                                    <p:animEffect transition="in" filter="fade">
-                                      <p:cBhvr>
-                                        <p:cTn id="12" dur="500"/>
-                                        <p:tgtEl>
-                                          <p:spTgt spid="3">
-                                            <p:txEl>
-                                              <p:pRg st="1" end="1"/>
-                                            </p:txEl>
-                                          </p:spTgt>
-                                        </p:tgtEl>
-                                      </p:cBhvr>
-                                    </p:animEffect>
-                                  </p:childTnLst>
-                                </p:cTn>
-                              </p:par>
-                            </p:childTnLst>
-                          </p:cTn>
-                        </p:par>
-                      </p:childTnLst>
-                    </p:cTn>
-                  </p:par>
-                  <p:par>
-                    <p:cTn id="13" fill="hold">
-                      <p:stCondLst>
-                        <p:cond delay="indefinite"/>
-                      </p:stCondLst>
-                      <p:childTnLst>
-                        <p:par>
-                          <p:cTn id="14" fill="hold">
-                            <p:stCondLst>
-                              <p:cond delay="0"/>
-                            </p:stCondLst>
-                            <p:childTnLst>
-                              <p:par>
-                                <p:cTn id="15" presetID="10" presetClass="entr" presetSubtype="0" fill="hold" nodeType="clickEffect">
-                                  <p:stCondLst>
-                                    <p:cond delay="0"/>
-                                  </p:stCondLst>
-                                  <p:childTnLst>
-                                    <p:set>
-                                      <p:cBhvr>
-                                        <p:cTn id="16" dur="1" fill="hold">
-                                          <p:stCondLst>
-                                            <p:cond delay="0"/>
-                                          </p:stCondLst>
-                                        </p:cTn>
-                                        <p:tgtEl>
-                                          <p:spTgt spid="3">
-                                            <p:txEl>
-                                              <p:pRg st="2" end="2"/>
-                                            </p:txEl>
-                                          </p:spTgt>
-                                        </p:tgtEl>
-                                        <p:attrNameLst>
-                                          <p:attrName>style.visibility</p:attrName>
-                                        </p:attrNameLst>
-                                      </p:cBhvr>
-                                      <p:to>
-                                        <p:strVal val="visible"/>
-                                      </p:to>
-                                    </p:set>
-                                    <p:animEffect transition="in" filter="fade">
-                                      <p:cBhvr>
-                                        <p:cTn id="17" dur="500"/>
-                                        <p:tgtEl>
-                                          <p:spTgt spid="3">
-                                            <p:txEl>
-                                              <p:pRg st="2" end="2"/>
-                                            </p:txEl>
-                                          </p:spTgt>
-                                        </p:tgtEl>
-                                      </p:cBhvr>
-                                    </p:animEffect>
-                                  </p:childTnLst>
-                                </p:cTn>
-                              </p:par>
-                            </p:childTnLst>
-                          </p:cTn>
-                        </p:par>
-                      </p:childTnLst>
-                    </p:cTn>
-                  </p:par>
-                  <p:par>
-                    <p:cTn id="18" fill="hold">
-                      <p:stCondLst>
-                        <p:cond delay="indefinite"/>
-                      </p:stCondLst>
-                      <p:childTnLst>
-                        <p:par>
-                          <p:cTn id="19" fill="hold">
-                            <p:stCondLst>
-                              <p:cond delay="0"/>
-                            </p:stCondLst>
-                            <p:childTnLst>
-                              <p:par>
-                                <p:cTn id="20" presetID="10" presetClass="entr" presetSubtype="0" fill="hold" nodeType="clickEffect">
-                                  <p:stCondLst>
-                                    <p:cond delay="0"/>
-                                  </p:stCondLst>
-                                  <p:childTnLst>
-                                    <p:set>
-                                      <p:cBhvr>
-                                        <p:cTn id="21" dur="1" fill="hold">
-                                          <p:stCondLst>
-                                            <p:cond delay="0"/>
-                                          </p:stCondLst>
-                                        </p:cTn>
-                                        <p:tgtEl>
-                                          <p:spTgt spid="3">
-                                            <p:txEl>
-                                              <p:pRg st="3" end="3"/>
-                                            </p:txEl>
-                                          </p:spTgt>
-                                        </p:tgtEl>
-                                        <p:attrNameLst>
-                                          <p:attrName>style.visibility</p:attrName>
-                                        </p:attrNameLst>
-                                      </p:cBhvr>
-                                      <p:to>
-                                        <p:strVal val="visible"/>
-                                      </p:to>
-                                    </p:set>
-                                    <p:animEffect transition="in" filter="fade">
-                                      <p:cBhvr>
-                                        <p:cTn id="22" dur="500"/>
-                                        <p:tgtEl>
-                                          <p:spTgt spid="3">
-                                            <p:txEl>
-                                              <p:pRg st="3" end="3"/>
-                                            </p:txEl>
-                                          </p:spTgt>
-                                        </p:tgtEl>
-                                      </p:cBhvr>
-                                    </p:animEffect>
-                                  </p:childTnLst>
-                                </p:cTn>
-                              </p:par>
-                            </p:childTnLst>
-                          </p:cTn>
-                        </p:par>
-                      </p:childTnLst>
-                    </p:cTn>
-                  </p:par>
-                  <p:par>
-                    <p:cTn id="23" fill="hold">
-                      <p:stCondLst>
-                        <p:cond delay="indefinite"/>
-                      </p:stCondLst>
-                      <p:childTnLst>
-                        <p:par>
-                          <p:cTn id="24" fill="hold">
-                            <p:stCondLst>
-                              <p:cond delay="0"/>
-                            </p:stCondLst>
-                            <p:childTnLst>
-                              <p:par>
-                                <p:cTn id="25" presetID="10" presetClass="entr" presetSubtype="0" fill="hold" nodeType="clickEffect">
-                                  <p:stCondLst>
-                                    <p:cond delay="0"/>
-                                  </p:stCondLst>
-                                  <p:childTnLst>
-                                    <p:set>
-                                      <p:cBhvr>
-                                        <p:cTn id="26" dur="1" fill="hold">
-                                          <p:stCondLst>
-                                            <p:cond delay="0"/>
-                                          </p:stCondLst>
-                                        </p:cTn>
-                                        <p:tgtEl>
-                                          <p:spTgt spid="3">
-                                            <p:txEl>
-                                              <p:pRg st="4" end="4"/>
-                                            </p:txEl>
-                                          </p:spTgt>
-                                        </p:tgtEl>
-                                        <p:attrNameLst>
-                                          <p:attrName>style.visibility</p:attrName>
-                                        </p:attrNameLst>
-                                      </p:cBhvr>
-                                      <p:to>
-                                        <p:strVal val="visible"/>
-                                      </p:to>
-                                    </p:set>
-                                    <p:animEffect transition="in" filter="fade">
-                                      <p:cBhvr>
-                                        <p:cTn id="27" dur="500"/>
-                                        <p:tgtEl>
-                                          <p:spTgt spid="3">
-                                            <p:txEl>
-                                              <p:pRg st="4" end="4"/>
-                                            </p:txEl>
-                                          </p:spTgt>
-                                        </p:tgtEl>
-                                      </p:cBhvr>
-                                    </p:animEffect>
-                                  </p:childTnLst>
-                                </p:cTn>
-                              </p:par>
-                            </p:childTnLst>
-                          </p:cTn>
-                        </p:par>
-                      </p:childTnLst>
-                    </p:cTn>
-                  </p:par>
-                  <p:par>
-                    <p:cTn id="28" fill="hold">
-                      <p:stCondLst>
-                        <p:cond delay="indefinite"/>
-                      </p:stCondLst>
-                      <p:childTnLst>
-                        <p:par>
-                          <p:cTn id="29" fill="hold">
-                            <p:stCondLst>
-                              <p:cond delay="0"/>
-                            </p:stCondLst>
-                            <p:childTnLst>
-                              <p:par>
-                                <p:cTn id="30" presetID="10" presetClass="entr" presetSubtype="0" fill="hold" nodeType="clickEffect">
-                                  <p:stCondLst>
-                                    <p:cond delay="0"/>
-                                  </p:stCondLst>
-                                  <p:childTnLst>
-                                    <p:set>
-                                      <p:cBhvr>
-                                        <p:cTn id="31" dur="1" fill="hold">
-                                          <p:stCondLst>
-                                            <p:cond delay="0"/>
-                                          </p:stCondLst>
-                                        </p:cTn>
-                                        <p:tgtEl>
-                                          <p:spTgt spid="3">
-                                            <p:txEl>
-                                              <p:pRg st="5" end="5"/>
-                                            </p:txEl>
-                                          </p:spTgt>
-                                        </p:tgtEl>
-                                        <p:attrNameLst>
-                                          <p:attrName>style.visibility</p:attrName>
-                                        </p:attrNameLst>
-                                      </p:cBhvr>
-                                      <p:to>
-                                        <p:strVal val="visible"/>
-                                      </p:to>
-                                    </p:set>
-                                    <p:animEffect transition="in" filter="fade">
-                                      <p:cBhvr>
-                                        <p:cTn id="32" dur="500"/>
-                                        <p:tgtEl>
-                                          <p:spTgt spid="3">
-                                            <p:txEl>
-                                              <p:pRg st="5" end="5"/>
-                                            </p:txEl>
-                                          </p:spTgt>
-                                        </p:tgtEl>
-                                      </p:cBhvr>
-                                    </p:animEffect>
-                                  </p:childTnLst>
-                                </p:cTn>
-                              </p:par>
-                            </p:childTnLst>
-                          </p:cTn>
-                        </p:par>
-                      </p:childTnLst>
-                    </p:cTn>
-                  </p:par>
-                  <p:par>
-                    <p:cTn id="33" fill="hold">
-                      <p:stCondLst>
-                        <p:cond delay="indefinite"/>
-                      </p:stCondLst>
-                      <p:childTnLst>
-                        <p:par>
-                          <p:cTn id="34" fill="hold">
-                            <p:stCondLst>
-                              <p:cond delay="0"/>
-                            </p:stCondLst>
-                            <p:childTnLst>
-                              <p:par>
-                                <p:cTn id="35" presetID="10" presetClass="entr" presetSubtype="0" fill="hold" nodeType="clickEffect">
-                                  <p:stCondLst>
-                                    <p:cond delay="0"/>
-                                  </p:stCondLst>
-                                  <p:childTnLst>
-                                    <p:set>
-                                      <p:cBhvr>
-                                        <p:cTn id="36" dur="1" fill="hold">
-                                          <p:stCondLst>
-                                            <p:cond delay="0"/>
-                                          </p:stCondLst>
-                                        </p:cTn>
-                                        <p:tgtEl>
-                                          <p:spTgt spid="3">
-                                            <p:txEl>
-                                              <p:pRg st="6" end="6"/>
-                                            </p:txEl>
-                                          </p:spTgt>
-                                        </p:tgtEl>
-                                        <p:attrNameLst>
-                                          <p:attrName>style.visibility</p:attrName>
-                                        </p:attrNameLst>
-                                      </p:cBhvr>
-                                      <p:to>
-                                        <p:strVal val="visible"/>
-                                      </p:to>
-                                    </p:set>
-                                    <p:animEffect transition="in" filter="fade">
-                                      <p:cBhvr>
-                                        <p:cTn id="37" dur="500"/>
-                                        <p:tgtEl>
-                                          <p:spTgt spid="3">
-                                            <p:txEl>
-                                              <p:pRg st="6" end="6"/>
-                                            </p:txEl>
-                                          </p:spTgt>
-                                        </p:tgtEl>
-                                      </p:cBhvr>
-                                    </p:animEffect>
-                                  </p:childTnLst>
-                                </p:cTn>
-                              </p:par>
-                            </p:childTnLst>
-                          </p:cTn>
-                        </p:par>
-                      </p:childTnLst>
-                    </p:cTn>
-                  </p:par>
-                </p:childTnLst>
-              </p:cTn>
-              <p:prevCondLst>
-                <p:cond evt="onPrev" delay="0">
-                  <p:tgtEl>
-                    <p:sldTgt/>
-                  </p:tgtEl>
-                </p:cond>
-              </p:prevCondLst>
-              <p:nextCondLst>
-                <p:cond evt="onNext" delay="0">
-                  <p:tgtEl>
-                    <p:sldTgt/>
-                  </p:tgtEl>
-                </p:cond>
-              </p:nextCondLst>
-            </p:seq>
-          </p:childTnLst>
-        </p:cTn>
+        <p:cTn id="1" dur="indefinite" restart="never" nodeType="tmRoot"/>
       </p:par>
     </p:tnLst>
   </p:timing>
@@ -26415,91 +25458,107 @@
             <p:ph idx="1"/>
           </p:nvPr>
         </p:nvSpPr>
-        <p:spPr>
-          <a:xfrm>
-            <a:off x="457200" y="1935480"/>
-            <a:ext cx="8291264" cy="4389120"/>
-          </a:xfrm>
-        </p:spPr>
+        <p:spPr/>
         <p:txBody>
           <a:bodyPr>
             <a:normAutofit/>
           </a:bodyPr>
           <a:lstStyle/>
           <a:p>
+            <a:pPr lvl="1"/>
+            <a:r>
+              <a:rPr lang="de-DE" dirty="0"/>
+              <a:t>Jede Revision enthält Metadaten</a:t>
+            </a:r>
+          </a:p>
+          <a:p>
             <a:pPr lvl="2"/>
             <a:r>
               <a:rPr lang="de-DE" dirty="0"/>
-              <a:t>Zusammenarbeit (Beispiel A möchte bei B mitentwickeln)</a:t>
-            </a:r>
-          </a:p>
-          <a:p>
-            <a:pPr lvl="3"/>
+              <a:t>Name des Autors</a:t>
+            </a:r>
+          </a:p>
+          <a:p>
+            <a:pPr lvl="2"/>
             <a:r>
               <a:rPr lang="de-DE" dirty="0"/>
-              <a:t>B macht Repository öffentlich (Hosting)</a:t>
-            </a:r>
-          </a:p>
-          <a:p>
-            <a:pPr lvl="3"/>
+              <a:t>Zeitstempel</a:t>
+            </a:r>
+          </a:p>
+          <a:p>
+            <a:pPr lvl="2"/>
             <a:r>
               <a:rPr lang="de-DE" dirty="0"/>
-              <a:t>Repository von B </a:t>
+              <a:t>Commit Message</a:t>
+            </a:r>
+          </a:p>
+          <a:p>
+            <a:pPr lvl="1"/>
+            <a:r>
+              <a:rPr lang="de-DE" dirty="0"/>
+              <a:t>Zugriff auf das Repository entweder lesend (vor allem bei </a:t>
             </a:r>
             <a:r>
               <a:rPr lang="de-DE" dirty="0" err="1"/>
-              <a:t>clonen</a:t>
+              <a:t>OpenSource</a:t>
             </a:r>
             <a:r>
               <a:rPr lang="de-DE" dirty="0"/>
-              <a:t> -&gt; A hat eigenes unabhängiges Repository</a:t>
-            </a:r>
-          </a:p>
-          <a:p>
-            <a:pPr lvl="3"/>
+              <a:t>-Projekten) oder so stark wie möglich eingeschränkt</a:t>
+            </a:r>
+          </a:p>
+          <a:p>
+            <a:pPr lvl="1"/>
             <a:r>
               <a:rPr lang="de-DE" dirty="0"/>
-              <a:t>Um auf dem gleichen Stand zu bleiben Remote Update: Regelmäßiges Pull von dessen Repository</a:t>
-            </a:r>
-          </a:p>
-          <a:p>
-            <a:pPr lvl="3"/>
+              <a:t>Schreibender Zugriff kann direkt gewährt werden (Commit-</a:t>
+            </a:r>
+            <a:r>
+              <a:rPr lang="de-DE" dirty="0" err="1"/>
+              <a:t>based</a:t>
+            </a:r>
             <a:r>
               <a:rPr lang="de-DE" dirty="0"/>
-              <a:t>Änderungen von A an B übertragen: </a:t>
-            </a:r>
-          </a:p>
-          <a:p>
-            <a:pPr lvl="4"/>
+              <a:t> </a:t>
+            </a:r>
+            <a:r>
+              <a:rPr lang="de-DE" dirty="0" err="1"/>
+              <a:t>Collaboration</a:t>
+            </a:r>
             <a:r>
               <a:rPr lang="de-DE" dirty="0"/>
-              <a:t>Veröffentlichung eigenes Repository und bittet um Pull ODER</a:t>
-            </a:r>
-          </a:p>
-          <a:p>
-            <a:pPr lvl="4"/>
+              <a:t>) oder indirekt (Patch-</a:t>
+            </a:r>
+            <a:r>
+              <a:rPr lang="de-DE" dirty="0" err="1"/>
+              <a:t>based</a:t>
+            </a:r>
             <a:r>
               <a:rPr lang="de-DE" dirty="0"/>
-              <a:t>Remote Commit: Rechte von B bekommen, direkt in dessen Repository zu pushen ODER</a:t>
-            </a:r>
-          </a:p>
-          <a:p>
-            <a:pPr lvl="4"/>
+              <a:t> </a:t>
+            </a:r>
+            <a:r>
+              <a:rPr lang="de-DE" dirty="0" err="1"/>
+              <a:t>Collaboration</a:t>
+            </a:r>
             <a:r>
               <a:rPr lang="de-DE" dirty="0"/>
-              <a:t>Versand von Patches</a:t>
-            </a:r>
-          </a:p>
-          <a:p>
-            <a:pPr lvl="3"/>
-            <a:endParaRPr lang="de-DE" dirty="0"/>
-          </a:p>
-          <a:p>
-            <a:pPr lvl="4"/>
-            <a:endParaRPr lang="de-DE" dirty="0"/>
-          </a:p>
-          <a:p>
-            <a:pPr lvl="4"/>
+              <a:t>)</a:t>
+            </a:r>
+          </a:p>
+          <a:p>
+            <a:pPr lvl="1"/>
+            <a:r>
+              <a:rPr lang="de-DE" dirty="0"/>
+              <a:t>Unterscheidung zwischen zentralen und dezentralen SCMs</a:t>
+            </a:r>
+          </a:p>
+          <a:p>
+            <a:pPr lvl="1"/>
+            <a:endParaRPr lang="de-DE" dirty="0"/>
+          </a:p>
+          <a:p>
+            <a:pPr lvl="1"/>
             <a:endParaRPr lang="de-DE" dirty="0"/>
           </a:p>
           <a:p>
@@ -26546,6 +25605,672 @@
             <a:fld id="{750AB064-513B-4E5C-9ADF-210709BEB955}" type="slidenum">
               <a:rPr lang="en-US" smtClean="0"/>
               <a:t>42</a:t>
+            </a:fld>
+            <a:endParaRPr lang="en-US"/>
+          </a:p>
+        </p:txBody>
+      </p:sp>
+    </p:spTree>
+    <p:extLst>
+      <p:ext uri="{BB962C8B-B14F-4D97-AF65-F5344CB8AC3E}">
+        <p14:creationId xmlns:p14="http://schemas.microsoft.com/office/powerpoint/2010/main" val="4006128135"/>
+      </p:ext>
+    </p:extLst>
+  </p:cSld>
+  <p:clrMapOvr>
+    <a:masterClrMapping/>
+  </p:clrMapOvr>
+  <mc:AlternateContent xmlns:mc="http://schemas.openxmlformats.org/markup-compatibility/2006" xmlns:p14="http://schemas.microsoft.com/office/powerpoint/2010/main">
+    <mc:Choice Requires="p14">
+      <p:transition spd="slow" p14:dur="2000"/>
+    </mc:Choice>
+    <mc:Fallback xmlns="">
+      <p:transition spd="slow"/>
+    </mc:Fallback>
+  </mc:AlternateContent>
+  <p:timing>
+    <p:tnLst>
+      <p:par>
+        <p:cTn id="1" dur="indefinite" restart="never" nodeType="tmRoot">
+          <p:childTnLst>
+            <p:seq concurrent="1" nextAc="seek">
+              <p:cTn id="2" dur="indefinite" nodeType="mainSeq">
+                <p:childTnLst>
+                  <p:par>
+                    <p:cTn id="3" fill="hold">
+                      <p:stCondLst>
+                        <p:cond delay="indefinite"/>
+                      </p:stCondLst>
+                      <p:childTnLst>
+                        <p:par>
+                          <p:cTn id="4" fill="hold">
+                            <p:stCondLst>
+                              <p:cond delay="0"/>
+                            </p:stCondLst>
+                            <p:childTnLst>
+                              <p:par>
+                                <p:cTn id="5" presetID="10" presetClass="entr" presetSubtype="0" fill="hold" nodeType="clickEffect">
+                                  <p:stCondLst>
+                                    <p:cond delay="0"/>
+                                  </p:stCondLst>
+                                  <p:childTnLst>
+                                    <p:set>
+                                      <p:cBhvr>
+                                        <p:cTn id="6" dur="1" fill="hold">
+                                          <p:stCondLst>
+                                            <p:cond delay="0"/>
+                                          </p:stCondLst>
+                                        </p:cTn>
+                                        <p:tgtEl>
+                                          <p:spTgt spid="3">
+                                            <p:txEl>
+                                              <p:pRg st="0" end="0"/>
+                                            </p:txEl>
+                                          </p:spTgt>
+                                        </p:tgtEl>
+                                        <p:attrNameLst>
+                                          <p:attrName>style.visibility</p:attrName>
+                                        </p:attrNameLst>
+                                      </p:cBhvr>
+                                      <p:to>
+                                        <p:strVal val="visible"/>
+                                      </p:to>
+                                    </p:set>
+                                    <p:animEffect transition="in" filter="fade">
+                                      <p:cBhvr>
+                                        <p:cTn id="7" dur="500"/>
+                                        <p:tgtEl>
+                                          <p:spTgt spid="3">
+                                            <p:txEl>
+                                              <p:pRg st="0" end="0"/>
+                                            </p:txEl>
+                                          </p:spTgt>
+                                        </p:tgtEl>
+                                      </p:cBhvr>
+                                    </p:animEffect>
+                                  </p:childTnLst>
+                                </p:cTn>
+                              </p:par>
+                            </p:childTnLst>
+                          </p:cTn>
+                        </p:par>
+                      </p:childTnLst>
+                    </p:cTn>
+                  </p:par>
+                  <p:par>
+                    <p:cTn id="8" fill="hold">
+                      <p:stCondLst>
+                        <p:cond delay="indefinite"/>
+                      </p:stCondLst>
+                      <p:childTnLst>
+                        <p:par>
+                          <p:cTn id="9" fill="hold">
+                            <p:stCondLst>
+                              <p:cond delay="0"/>
+                            </p:stCondLst>
+                            <p:childTnLst>
+                              <p:par>
+                                <p:cTn id="10" presetID="10" presetClass="entr" presetSubtype="0" fill="hold" nodeType="clickEffect">
+                                  <p:stCondLst>
+                                    <p:cond delay="0"/>
+                                  </p:stCondLst>
+                                  <p:childTnLst>
+                                    <p:set>
+                                      <p:cBhvr>
+                                        <p:cTn id="11" dur="1" fill="hold">
+                                          <p:stCondLst>
+                                            <p:cond delay="0"/>
+                                          </p:stCondLst>
+                                        </p:cTn>
+                                        <p:tgtEl>
+                                          <p:spTgt spid="3">
+                                            <p:txEl>
+                                              <p:pRg st="1" end="1"/>
+                                            </p:txEl>
+                                          </p:spTgt>
+                                        </p:tgtEl>
+                                        <p:attrNameLst>
+                                          <p:attrName>style.visibility</p:attrName>
+                                        </p:attrNameLst>
+                                      </p:cBhvr>
+                                      <p:to>
+                                        <p:strVal val="visible"/>
+                                      </p:to>
+                                    </p:set>
+                                    <p:animEffect transition="in" filter="fade">
+                                      <p:cBhvr>
+                                        <p:cTn id="12" dur="500"/>
+                                        <p:tgtEl>
+                                          <p:spTgt spid="3">
+                                            <p:txEl>
+                                              <p:pRg st="1" end="1"/>
+                                            </p:txEl>
+                                          </p:spTgt>
+                                        </p:tgtEl>
+                                      </p:cBhvr>
+                                    </p:animEffect>
+                                  </p:childTnLst>
+                                </p:cTn>
+                              </p:par>
+                            </p:childTnLst>
+                          </p:cTn>
+                        </p:par>
+                      </p:childTnLst>
+                    </p:cTn>
+                  </p:par>
+                  <p:par>
+                    <p:cTn id="13" fill="hold">
+                      <p:stCondLst>
+                        <p:cond delay="indefinite"/>
+                      </p:stCondLst>
+                      <p:childTnLst>
+                        <p:par>
+                          <p:cTn id="14" fill="hold">
+                            <p:stCondLst>
+                              <p:cond delay="0"/>
+                            </p:stCondLst>
+                            <p:childTnLst>
+                              <p:par>
+                                <p:cTn id="15" presetID="10" presetClass="entr" presetSubtype="0" fill="hold" nodeType="clickEffect">
+                                  <p:stCondLst>
+                                    <p:cond delay="0"/>
+                                  </p:stCondLst>
+                                  <p:childTnLst>
+                                    <p:set>
+                                      <p:cBhvr>
+                                        <p:cTn id="16" dur="1" fill="hold">
+                                          <p:stCondLst>
+                                            <p:cond delay="0"/>
+                                          </p:stCondLst>
+                                        </p:cTn>
+                                        <p:tgtEl>
+                                          <p:spTgt spid="3">
+                                            <p:txEl>
+                                              <p:pRg st="2" end="2"/>
+                                            </p:txEl>
+                                          </p:spTgt>
+                                        </p:tgtEl>
+                                        <p:attrNameLst>
+                                          <p:attrName>style.visibility</p:attrName>
+                                        </p:attrNameLst>
+                                      </p:cBhvr>
+                                      <p:to>
+                                        <p:strVal val="visible"/>
+                                      </p:to>
+                                    </p:set>
+                                    <p:animEffect transition="in" filter="fade">
+                                      <p:cBhvr>
+                                        <p:cTn id="17" dur="500"/>
+                                        <p:tgtEl>
+                                          <p:spTgt spid="3">
+                                            <p:txEl>
+                                              <p:pRg st="2" end="2"/>
+                                            </p:txEl>
+                                          </p:spTgt>
+                                        </p:tgtEl>
+                                      </p:cBhvr>
+                                    </p:animEffect>
+                                  </p:childTnLst>
+                                </p:cTn>
+                              </p:par>
+                            </p:childTnLst>
+                          </p:cTn>
+                        </p:par>
+                      </p:childTnLst>
+                    </p:cTn>
+                  </p:par>
+                  <p:par>
+                    <p:cTn id="18" fill="hold">
+                      <p:stCondLst>
+                        <p:cond delay="indefinite"/>
+                      </p:stCondLst>
+                      <p:childTnLst>
+                        <p:par>
+                          <p:cTn id="19" fill="hold">
+                            <p:stCondLst>
+                              <p:cond delay="0"/>
+                            </p:stCondLst>
+                            <p:childTnLst>
+                              <p:par>
+                                <p:cTn id="20" presetID="10" presetClass="entr" presetSubtype="0" fill="hold" nodeType="clickEffect">
+                                  <p:stCondLst>
+                                    <p:cond delay="0"/>
+                                  </p:stCondLst>
+                                  <p:childTnLst>
+                                    <p:set>
+                                      <p:cBhvr>
+                                        <p:cTn id="21" dur="1" fill="hold">
+                                          <p:stCondLst>
+                                            <p:cond delay="0"/>
+                                          </p:stCondLst>
+                                        </p:cTn>
+                                        <p:tgtEl>
+                                          <p:spTgt spid="3">
+                                            <p:txEl>
+                                              <p:pRg st="3" end="3"/>
+                                            </p:txEl>
+                                          </p:spTgt>
+                                        </p:tgtEl>
+                                        <p:attrNameLst>
+                                          <p:attrName>style.visibility</p:attrName>
+                                        </p:attrNameLst>
+                                      </p:cBhvr>
+                                      <p:to>
+                                        <p:strVal val="visible"/>
+                                      </p:to>
+                                    </p:set>
+                                    <p:animEffect transition="in" filter="fade">
+                                      <p:cBhvr>
+                                        <p:cTn id="22" dur="500"/>
+                                        <p:tgtEl>
+                                          <p:spTgt spid="3">
+                                            <p:txEl>
+                                              <p:pRg st="3" end="3"/>
+                                            </p:txEl>
+                                          </p:spTgt>
+                                        </p:tgtEl>
+                                      </p:cBhvr>
+                                    </p:animEffect>
+                                  </p:childTnLst>
+                                </p:cTn>
+                              </p:par>
+                            </p:childTnLst>
+                          </p:cTn>
+                        </p:par>
+                      </p:childTnLst>
+                    </p:cTn>
+                  </p:par>
+                  <p:par>
+                    <p:cTn id="23" fill="hold">
+                      <p:stCondLst>
+                        <p:cond delay="indefinite"/>
+                      </p:stCondLst>
+                      <p:childTnLst>
+                        <p:par>
+                          <p:cTn id="24" fill="hold">
+                            <p:stCondLst>
+                              <p:cond delay="0"/>
+                            </p:stCondLst>
+                            <p:childTnLst>
+                              <p:par>
+                                <p:cTn id="25" presetID="10" presetClass="entr" presetSubtype="0" fill="hold" nodeType="clickEffect">
+                                  <p:stCondLst>
+                                    <p:cond delay="0"/>
+                                  </p:stCondLst>
+                                  <p:childTnLst>
+                                    <p:set>
+                                      <p:cBhvr>
+                                        <p:cTn id="26" dur="1" fill="hold">
+                                          <p:stCondLst>
+                                            <p:cond delay="0"/>
+                                          </p:stCondLst>
+                                        </p:cTn>
+                                        <p:tgtEl>
+                                          <p:spTgt spid="3">
+                                            <p:txEl>
+                                              <p:pRg st="4" end="4"/>
+                                            </p:txEl>
+                                          </p:spTgt>
+                                        </p:tgtEl>
+                                        <p:attrNameLst>
+                                          <p:attrName>style.visibility</p:attrName>
+                                        </p:attrNameLst>
+                                      </p:cBhvr>
+                                      <p:to>
+                                        <p:strVal val="visible"/>
+                                      </p:to>
+                                    </p:set>
+                                    <p:animEffect transition="in" filter="fade">
+                                      <p:cBhvr>
+                                        <p:cTn id="27" dur="500"/>
+                                        <p:tgtEl>
+                                          <p:spTgt spid="3">
+                                            <p:txEl>
+                                              <p:pRg st="4" end="4"/>
+                                            </p:txEl>
+                                          </p:spTgt>
+                                        </p:tgtEl>
+                                      </p:cBhvr>
+                                    </p:animEffect>
+                                  </p:childTnLst>
+                                </p:cTn>
+                              </p:par>
+                            </p:childTnLst>
+                          </p:cTn>
+                        </p:par>
+                      </p:childTnLst>
+                    </p:cTn>
+                  </p:par>
+                  <p:par>
+                    <p:cTn id="28" fill="hold">
+                      <p:stCondLst>
+                        <p:cond delay="indefinite"/>
+                      </p:stCondLst>
+                      <p:childTnLst>
+                        <p:par>
+                          <p:cTn id="29" fill="hold">
+                            <p:stCondLst>
+                              <p:cond delay="0"/>
+                            </p:stCondLst>
+                            <p:childTnLst>
+                              <p:par>
+                                <p:cTn id="30" presetID="10" presetClass="entr" presetSubtype="0" fill="hold" nodeType="clickEffect">
+                                  <p:stCondLst>
+                                    <p:cond delay="0"/>
+                                  </p:stCondLst>
+                                  <p:childTnLst>
+                                    <p:set>
+                                      <p:cBhvr>
+                                        <p:cTn id="31" dur="1" fill="hold">
+                                          <p:stCondLst>
+                                            <p:cond delay="0"/>
+                                          </p:stCondLst>
+                                        </p:cTn>
+                                        <p:tgtEl>
+                                          <p:spTgt spid="3">
+                                            <p:txEl>
+                                              <p:pRg st="5" end="5"/>
+                                            </p:txEl>
+                                          </p:spTgt>
+                                        </p:tgtEl>
+                                        <p:attrNameLst>
+                                          <p:attrName>style.visibility</p:attrName>
+                                        </p:attrNameLst>
+                                      </p:cBhvr>
+                                      <p:to>
+                                        <p:strVal val="visible"/>
+                                      </p:to>
+                                    </p:set>
+                                    <p:animEffect transition="in" filter="fade">
+                                      <p:cBhvr>
+                                        <p:cTn id="32" dur="500"/>
+                                        <p:tgtEl>
+                                          <p:spTgt spid="3">
+                                            <p:txEl>
+                                              <p:pRg st="5" end="5"/>
+                                            </p:txEl>
+                                          </p:spTgt>
+                                        </p:tgtEl>
+                                      </p:cBhvr>
+                                    </p:animEffect>
+                                  </p:childTnLst>
+                                </p:cTn>
+                              </p:par>
+                            </p:childTnLst>
+                          </p:cTn>
+                        </p:par>
+                      </p:childTnLst>
+                    </p:cTn>
+                  </p:par>
+                  <p:par>
+                    <p:cTn id="33" fill="hold">
+                      <p:stCondLst>
+                        <p:cond delay="indefinite"/>
+                      </p:stCondLst>
+                      <p:childTnLst>
+                        <p:par>
+                          <p:cTn id="34" fill="hold">
+                            <p:stCondLst>
+                              <p:cond delay="0"/>
+                            </p:stCondLst>
+                            <p:childTnLst>
+                              <p:par>
+                                <p:cTn id="35" presetID="10" presetClass="entr" presetSubtype="0" fill="hold" nodeType="clickEffect">
+                                  <p:stCondLst>
+                                    <p:cond delay="0"/>
+                                  </p:stCondLst>
+                                  <p:childTnLst>
+                                    <p:set>
+                                      <p:cBhvr>
+                                        <p:cTn id="36" dur="1" fill="hold">
+                                          <p:stCondLst>
+                                            <p:cond delay="0"/>
+                                          </p:stCondLst>
+                                        </p:cTn>
+                                        <p:tgtEl>
+                                          <p:spTgt spid="3">
+                                            <p:txEl>
+                                              <p:pRg st="6" end="6"/>
+                                            </p:txEl>
+                                          </p:spTgt>
+                                        </p:tgtEl>
+                                        <p:attrNameLst>
+                                          <p:attrName>style.visibility</p:attrName>
+                                        </p:attrNameLst>
+                                      </p:cBhvr>
+                                      <p:to>
+                                        <p:strVal val="visible"/>
+                                      </p:to>
+                                    </p:set>
+                                    <p:animEffect transition="in" filter="fade">
+                                      <p:cBhvr>
+                                        <p:cTn id="37" dur="500"/>
+                                        <p:tgtEl>
+                                          <p:spTgt spid="3">
+                                            <p:txEl>
+                                              <p:pRg st="6" end="6"/>
+                                            </p:txEl>
+                                          </p:spTgt>
+                                        </p:tgtEl>
+                                      </p:cBhvr>
+                                    </p:animEffect>
+                                  </p:childTnLst>
+                                </p:cTn>
+                              </p:par>
+                            </p:childTnLst>
+                          </p:cTn>
+                        </p:par>
+                      </p:childTnLst>
+                    </p:cTn>
+                  </p:par>
+                </p:childTnLst>
+              </p:cTn>
+              <p:prevCondLst>
+                <p:cond evt="onPrev" delay="0">
+                  <p:tgtEl>
+                    <p:sldTgt/>
+                  </p:tgtEl>
+                </p:cond>
+              </p:prevCondLst>
+              <p:nextCondLst>
+                <p:cond evt="onNext" delay="0">
+                  <p:tgtEl>
+                    <p:sldTgt/>
+                  </p:tgtEl>
+                </p:cond>
+              </p:nextCondLst>
+            </p:seq>
+          </p:childTnLst>
+        </p:cTn>
+      </p:par>
+    </p:tnLst>
+  </p:timing>
+</p:sld>
+</file>
+
+<file path=ppt/slides/slide43.xml><?xml version="1.0" encoding="utf-8"?>
+<p:sld xmlns:a="http://schemas.openxmlformats.org/drawingml/2006/main" xmlns:r="http://schemas.openxmlformats.org/officeDocument/2006/relationships" xmlns:p="http://schemas.openxmlformats.org/presentationml/2006/main">
+  <p:cSld>
+    <p:spTree>
+      <p:nvGrpSpPr>
+        <p:cNvPr id="1" name=""/>
+        <p:cNvGrpSpPr/>
+        <p:nvPr/>
+      </p:nvGrpSpPr>
+      <p:grpSpPr>
+        <a:xfrm>
+          <a:off x="0" y="0"/>
+          <a:ext cx="0" cy="0"/>
+          <a:chOff x="0" y="0"/>
+          <a:chExt cx="0" cy="0"/>
+        </a:xfrm>
+      </p:grpSpPr>
+      <p:sp>
+        <p:nvSpPr>
+          <p:cNvPr id="2" name="Title 1"/>
+          <p:cNvSpPr>
+            <a:spLocks noGrp="1"/>
+          </p:cNvSpPr>
+          <p:nvPr>
+            <p:ph type="title"/>
+          </p:nvPr>
+        </p:nvSpPr>
+        <p:spPr/>
+        <p:txBody>
+          <a:bodyPr>
+            <a:normAutofit/>
+          </a:bodyPr>
+          <a:lstStyle/>
+          <a:p>
+            <a:r>
+              <a:rPr lang="en-US" dirty="0" err="1"/>
+              <a:t>Versionsverwaltungssysteme</a:t>
+            </a:r>
+            <a:endParaRPr lang="en-US" dirty="0"/>
+          </a:p>
+        </p:txBody>
+      </p:sp>
+      <p:sp>
+        <p:nvSpPr>
+          <p:cNvPr id="3" name="Content Placeholder 2"/>
+          <p:cNvSpPr>
+            <a:spLocks noGrp="1"/>
+          </p:cNvSpPr>
+          <p:nvPr>
+            <p:ph idx="1"/>
+          </p:nvPr>
+        </p:nvSpPr>
+        <p:spPr>
+          <a:xfrm>
+            <a:off x="457200" y="1935480"/>
+            <a:ext cx="8291264" cy="4389120"/>
+          </a:xfrm>
+        </p:spPr>
+        <p:txBody>
+          <a:bodyPr>
+            <a:normAutofit/>
+          </a:bodyPr>
+          <a:lstStyle/>
+          <a:p>
+            <a:pPr lvl="2"/>
+            <a:r>
+              <a:rPr lang="de-DE" dirty="0"/>
+              <a:t>Zusammenarbeit (Beispiel A möchte bei B mitentwickeln)</a:t>
+            </a:r>
+          </a:p>
+          <a:p>
+            <a:pPr lvl="3"/>
+            <a:r>
+              <a:rPr lang="de-DE" dirty="0"/>
+              <a:t>B macht Repository öffentlich (Hosting)</a:t>
+            </a:r>
+          </a:p>
+          <a:p>
+            <a:pPr lvl="3"/>
+            <a:r>
+              <a:rPr lang="de-DE" dirty="0"/>
+              <a:t>Repository von B </a:t>
+            </a:r>
+            <a:r>
+              <a:rPr lang="de-DE" dirty="0" err="1"/>
+              <a:t>clonen</a:t>
+            </a:r>
+            <a:r>
+              <a:rPr lang="de-DE" dirty="0"/>
+              <a:t> -&gt; A hat eigenes unabhängiges Repository</a:t>
+            </a:r>
+          </a:p>
+          <a:p>
+            <a:pPr lvl="3"/>
+            <a:r>
+              <a:rPr lang="de-DE" dirty="0"/>
+              <a:t>Um auf dem gleichen Stand zu bleiben Remote Update: Regelmäßiges Pull von dessen Repository</a:t>
+            </a:r>
+          </a:p>
+          <a:p>
+            <a:pPr lvl="3"/>
+            <a:r>
+              <a:rPr lang="de-DE" dirty="0"/>
+              <a:t>Änderungen von A an B übertragen: </a:t>
+            </a:r>
+          </a:p>
+          <a:p>
+            <a:pPr lvl="4"/>
+            <a:r>
+              <a:rPr lang="de-DE" dirty="0"/>
+              <a:t>Veröffentlichung eigenes Repository und bittet um Pull ODER</a:t>
+            </a:r>
+          </a:p>
+          <a:p>
+            <a:pPr lvl="4"/>
+            <a:r>
+              <a:rPr lang="de-DE" dirty="0"/>
+              <a:t>Remote Commit: Rechte von B bekommen, direkt in dessen Repository zu pushen ODER</a:t>
+            </a:r>
+          </a:p>
+          <a:p>
+            <a:pPr lvl="4"/>
+            <a:r>
+              <a:rPr lang="de-DE" dirty="0"/>
+              <a:t>Versand von Patches</a:t>
+            </a:r>
+          </a:p>
+          <a:p>
+            <a:pPr lvl="3"/>
+            <a:endParaRPr lang="de-DE" dirty="0"/>
+          </a:p>
+          <a:p>
+            <a:pPr lvl="4"/>
+            <a:endParaRPr lang="de-DE" dirty="0"/>
+          </a:p>
+          <a:p>
+            <a:pPr lvl="4"/>
+            <a:endParaRPr lang="de-DE" dirty="0"/>
+          </a:p>
+          <a:p>
+            <a:pPr lvl="2"/>
+            <a:endParaRPr lang="de-DE" dirty="0"/>
+          </a:p>
+          <a:p>
+            <a:pPr lvl="2"/>
+            <a:endParaRPr lang="de-DE" dirty="0"/>
+          </a:p>
+          <a:p>
+            <a:pPr lvl="1"/>
+            <a:endParaRPr lang="de-DE" dirty="0"/>
+          </a:p>
+          <a:p>
+            <a:pPr lvl="2"/>
+            <a:endParaRPr lang="de-DE" dirty="0"/>
+          </a:p>
+          <a:p>
+            <a:pPr lvl="2"/>
+            <a:endParaRPr lang="de-DE" dirty="0"/>
+          </a:p>
+          <a:p>
+            <a:pPr lvl="2"/>
+            <a:endParaRPr lang="de-DE" dirty="0"/>
+          </a:p>
+        </p:txBody>
+      </p:sp>
+      <p:sp>
+        <p:nvSpPr>
+          <p:cNvPr id="4" name="Foliennummernplatzhalter 3"/>
+          <p:cNvSpPr>
+            <a:spLocks noGrp="1"/>
+          </p:cNvSpPr>
+          <p:nvPr>
+            <p:ph type="sldNum" sz="quarter" idx="12"/>
+          </p:nvPr>
+        </p:nvSpPr>
+        <p:spPr/>
+        <p:txBody>
+          <a:bodyPr/>
+          <a:lstStyle/>
+          <a:p>
+            <a:fld id="{750AB064-513B-4E5C-9ADF-210709BEB955}" type="slidenum">
+              <a:rPr lang="en-US" smtClean="0"/>
+              <a:t>43</a:t>
             </a:fld>
             <a:endParaRPr lang="en-US"/>
           </a:p>
@@ -27082,7 +26807,7 @@
 </p:sld>
 </file>
 
-<file path=ppt/slides/slide43.xml><?xml version="1.0" encoding="utf-8"?>
+<file path=ppt/slides/slide44.xml><?xml version="1.0" encoding="utf-8"?>
 <p:sld xmlns:a="http://schemas.openxmlformats.org/drawingml/2006/main" xmlns:r="http://schemas.openxmlformats.org/officeDocument/2006/relationships" xmlns:p="http://schemas.openxmlformats.org/presentationml/2006/main" show="0">
   <p:cSld>
     <p:spTree>
@@ -27244,7 +26969,7 @@
           <a:p>
             <a:fld id="{750AB064-513B-4E5C-9ADF-210709BEB955}" type="slidenum">
               <a:rPr lang="en-US" smtClean="0"/>
-              <a:t>43</a:t>
+              <a:t>44</a:t>
             </a:fld>
             <a:endParaRPr lang="en-US"/>
           </a:p>
@@ -27660,7 +27385,7 @@
 </p:sld>
 </file>
 
-<file path=ppt/slides/slide44.xml><?xml version="1.0" encoding="utf-8"?>
+<file path=ppt/slides/slide45.xml><?xml version="1.0" encoding="utf-8"?>
 <p:sld xmlns:a="http://schemas.openxmlformats.org/drawingml/2006/main" xmlns:r="http://schemas.openxmlformats.org/officeDocument/2006/relationships" xmlns:p="http://schemas.openxmlformats.org/presentationml/2006/main" show="0">
   <p:cSld>
     <p:spTree>
@@ -27839,7 +27564,7 @@
           <a:p>
             <a:fld id="{750AB064-513B-4E5C-9ADF-210709BEB955}" type="slidenum">
               <a:rPr lang="en-US" smtClean="0"/>
-              <a:t>44</a:t>
+              <a:t>45</a:t>
             </a:fld>
             <a:endParaRPr lang="en-US"/>
           </a:p>
@@ -28140,7 +27865,7 @@
 </p:sld>
 </file>
 
-<file path=ppt/slides/slide45.xml><?xml version="1.0" encoding="utf-8"?>
+<file path=ppt/slides/slide46.xml><?xml version="1.0" encoding="utf-8"?>
 <p:sld xmlns:a="http://schemas.openxmlformats.org/drawingml/2006/main" xmlns:r="http://schemas.openxmlformats.org/officeDocument/2006/relationships" xmlns:p="http://schemas.openxmlformats.org/presentationml/2006/main">
   <p:cSld>
     <p:spTree>
@@ -28314,7 +28039,7 @@
           <a:p>
             <a:fld id="{750AB064-513B-4E5C-9ADF-210709BEB955}" type="slidenum">
               <a:rPr lang="en-US" smtClean="0"/>
-              <a:t>45</a:t>
+              <a:t>46</a:t>
             </a:fld>
             <a:endParaRPr lang="en-US"/>
           </a:p>
@@ -28658,11 +28383,11 @@
   <p:clrMapOvr>
     <a:masterClrMapping/>
   </p:clrMapOvr>
-  <mc:AlternateContent xmlns:mc="http://schemas.openxmlformats.org/markup-compatibility/2006">
-    <mc:Choice xmlns:p14="http://schemas.microsoft.com/office/powerpoint/2010/main" Requires="p14">
+  <mc:AlternateContent xmlns:mc="http://schemas.openxmlformats.org/markup-compatibility/2006" xmlns:p14="http://schemas.microsoft.com/office/powerpoint/2010/main">
+    <mc:Choice Requires="p14">
       <p:transition spd="slow" p14:dur="2000"/>
     </mc:Choice>
-    <mc:Fallback>
+    <mc:Fallback xmlns="">
       <p:transition spd="slow"/>
     </mc:Fallback>
   </mc:AlternateContent>
@@ -29364,11 +29089,7 @@
             <a:pPr lvl="1"/>
             <a:r>
               <a:rPr lang="de-DE" dirty="0" smtClean="0"/>
-              <a:t>Automatisierte </a:t>
-            </a:r>
-            <a:r>
-              <a:rPr lang="de-DE" dirty="0" smtClean="0"/>
-              <a:t>Verteilung </a:t>
+              <a:t>Automatisierte Verteilung </a:t>
             </a:r>
             <a:endParaRPr lang="de-DE" dirty="0"/>
           </a:p>
@@ -30382,11 +30103,7 @@
             <a:pPr lvl="1"/>
             <a:r>
               <a:rPr lang="de-DE" dirty="0" smtClean="0"/>
-              <a:t>SCM </a:t>
-            </a:r>
-            <a:r>
-              <a:rPr lang="de-DE" dirty="0" smtClean="0"/>
-              <a:t>werden gebraucht um</a:t>
+              <a:t>SCM werden gebraucht um</a:t>
             </a:r>
             <a:endParaRPr lang="de-DE" dirty="0"/>
           </a:p>

</xml_diff>